<commit_message>
Update with full Week 4 info
</commit_message>
<xml_diff>
--- a/Python OOP Course Presentation.pptx
+++ b/Python OOP Course Presentation.pptx
@@ -55,14 +55,21 @@
     <p:sldId id="300" r:id="rId50"/>
     <p:sldId id="301" r:id="rId51"/>
     <p:sldId id="302" r:id="rId52"/>
+    <p:sldId id="303" r:id="rId53"/>
+    <p:sldId id="304" r:id="rId54"/>
+    <p:sldId id="305" r:id="rId55"/>
+    <p:sldId id="306" r:id="rId56"/>
+    <p:sldId id="307" r:id="rId57"/>
+    <p:sldId id="308" r:id="rId58"/>
+    <p:sldId id="309" r:id="rId59"/>
   </p:sldIdLst>
   <p:sldSz cy="10287000" cx="18288000"/>
   <p:notesSz cx="6858000" cy="9144000"/>
   <p:embeddedFontLst>
     <p:embeddedFont>
       <p:font typeface="Fredoka"/>
-      <p:regular r:id="rId53"/>
-      <p:bold r:id="rId54"/>
+      <p:regular r:id="rId60"/>
+      <p:bold r:id="rId61"/>
     </p:embeddedFont>
   </p:embeddedFontLst>
   <p:defaultTextStyle>
@@ -5532,6 +5539,222 @@
 </p:notes>
 </file>
 
+<file path=ppt/notesSlides/notesSlide48.xml><?xml version="1.0" encoding="utf-8"?>
+<p:notes xmlns:a="http://schemas.openxmlformats.org/drawingml/2006/main" xmlns:r="http://schemas.openxmlformats.org/officeDocument/2006/relationships" xmlns:mc="http://schemas.openxmlformats.org/markup-compatibility/2006" xmlns:mv="urn:schemas-microsoft-com:mac:vml" xmlns:p="http://schemas.openxmlformats.org/presentationml/2006/main" xmlns:c="http://schemas.openxmlformats.org/drawingml/2006/chart" xmlns:dgm="http://schemas.openxmlformats.org/drawingml/2006/diagram" xmlns:o="urn:schemas-microsoft-com:office:office" xmlns:v="urn:schemas-microsoft-com:vml" xmlns:pvml="urn:schemas-microsoft-com:office:powerpoint" xmlns:com="http://schemas.openxmlformats.org/drawingml/2006/compatibility" xmlns:p14="http://schemas.microsoft.com/office/powerpoint/2010/main" xmlns:p15="http://schemas.microsoft.com/office/powerpoint/2012/main" xmlns:ahyp="http://schemas.microsoft.com/office/drawing/2018/hyperlinkcolor" showMasterPhAnim="0" showMasterSp="0">
+  <p:cSld>
+    <p:spTree>
+      <p:nvGrpSpPr>
+        <p:cNvPr id="413" name="Shape 413"/>
+        <p:cNvGrpSpPr/>
+        <p:nvPr/>
+      </p:nvGrpSpPr>
+      <p:grpSpPr>
+        <a:xfrm>
+          <a:off x="0" y="0"/>
+          <a:ext cx="0" cy="0"/>
+          <a:chOff x="0" y="0"/>
+          <a:chExt cx="0" cy="0"/>
+        </a:xfrm>
+      </p:grpSpPr>
+      <p:sp>
+        <p:nvSpPr>
+          <p:cNvPr id="414" name="Google Shape;414;g270f6708402_0_0:notes"/>
+          <p:cNvSpPr/>
+          <p:nvPr>
+            <p:ph idx="2" type="sldImg"/>
+          </p:nvPr>
+        </p:nvSpPr>
+        <p:spPr>
+          <a:xfrm>
+            <a:off x="381000" y="685800"/>
+            <a:ext cx="6096000" cy="3429000"/>
+          </a:xfrm>
+          <a:custGeom>
+            <a:rect b="b" l="l" r="r" t="t"/>
+            <a:pathLst>
+              <a:path extrusionOk="0" h="120000" w="120000">
+                <a:moveTo>
+                  <a:pt x="0" y="0"/>
+                </a:moveTo>
+                <a:lnTo>
+                  <a:pt x="120000" y="0"/>
+                </a:lnTo>
+                <a:lnTo>
+                  <a:pt x="120000" y="120000"/>
+                </a:lnTo>
+                <a:lnTo>
+                  <a:pt x="0" y="120000"/>
+                </a:lnTo>
+                <a:close/>
+              </a:path>
+            </a:pathLst>
+          </a:custGeom>
+          <a:noFill/>
+          <a:ln cap="flat" cmpd="sng" w="9525">
+            <a:solidFill>
+              <a:srgbClr val="000000"/>
+            </a:solidFill>
+            <a:prstDash val="solid"/>
+            <a:round/>
+            <a:headEnd len="sm" w="sm" type="none"/>
+            <a:tailEnd len="sm" w="sm" type="none"/>
+          </a:ln>
+        </p:spPr>
+      </p:sp>
+      <p:sp>
+        <p:nvSpPr>
+          <p:cNvPr id="415" name="Google Shape;415;g270f6708402_0_0:notes"/>
+          <p:cNvSpPr txBox="1"/>
+          <p:nvPr>
+            <p:ph idx="1" type="body"/>
+          </p:nvPr>
+        </p:nvSpPr>
+        <p:spPr>
+          <a:xfrm>
+            <a:off x="685800" y="4343400"/>
+            <a:ext cx="5486400" cy="4114800"/>
+          </a:xfrm>
+          <a:prstGeom prst="rect">
+            <a:avLst/>
+          </a:prstGeom>
+          <a:noFill/>
+          <a:ln>
+            <a:noFill/>
+          </a:ln>
+        </p:spPr>
+        <p:txBody>
+          <a:bodyPr anchorCtr="0" anchor="t" bIns="91425" lIns="91425" spcFirstLastPara="1" rIns="91425" wrap="square" tIns="91425">
+            <a:noAutofit/>
+          </a:bodyPr>
+          <a:lstStyle/>
+          <a:p>
+            <a:pPr indent="0" lvl="0" marL="0" rtl="0" algn="l">
+              <a:lnSpc>
+                <a:spcPct val="100000"/>
+              </a:lnSpc>
+              <a:spcBef>
+                <a:spcPts val="0"/>
+              </a:spcBef>
+              <a:spcAft>
+                <a:spcPts val="0"/>
+              </a:spcAft>
+              <a:buSzPts val="1100"/>
+              <a:buNone/>
+            </a:pPr>
+            <a:r>
+              <a:t/>
+            </a:r>
+            <a:endParaRPr/>
+          </a:p>
+        </p:txBody>
+      </p:sp>
+    </p:spTree>
+  </p:cSld>
+  <p:clrMapOvr>
+    <a:masterClrMapping/>
+  </p:clrMapOvr>
+</p:notes>
+</file>
+
+<file path=ppt/notesSlides/notesSlide49.xml><?xml version="1.0" encoding="utf-8"?>
+<p:notes xmlns:a="http://schemas.openxmlformats.org/drawingml/2006/main" xmlns:r="http://schemas.openxmlformats.org/officeDocument/2006/relationships" xmlns:mc="http://schemas.openxmlformats.org/markup-compatibility/2006" xmlns:mv="urn:schemas-microsoft-com:mac:vml" xmlns:p="http://schemas.openxmlformats.org/presentationml/2006/main" xmlns:c="http://schemas.openxmlformats.org/drawingml/2006/chart" xmlns:dgm="http://schemas.openxmlformats.org/drawingml/2006/diagram" xmlns:o="urn:schemas-microsoft-com:office:office" xmlns:v="urn:schemas-microsoft-com:vml" xmlns:pvml="urn:schemas-microsoft-com:office:powerpoint" xmlns:com="http://schemas.openxmlformats.org/drawingml/2006/compatibility" xmlns:p14="http://schemas.microsoft.com/office/powerpoint/2010/main" xmlns:p15="http://schemas.microsoft.com/office/powerpoint/2012/main" xmlns:ahyp="http://schemas.microsoft.com/office/drawing/2018/hyperlinkcolor" showMasterPhAnim="0" showMasterSp="0">
+  <p:cSld>
+    <p:spTree>
+      <p:nvGrpSpPr>
+        <p:cNvPr id="420" name="Shape 420"/>
+        <p:cNvGrpSpPr/>
+        <p:nvPr/>
+      </p:nvGrpSpPr>
+      <p:grpSpPr>
+        <a:xfrm>
+          <a:off x="0" y="0"/>
+          <a:ext cx="0" cy="0"/>
+          <a:chOff x="0" y="0"/>
+          <a:chExt cx="0" cy="0"/>
+        </a:xfrm>
+      </p:grpSpPr>
+      <p:sp>
+        <p:nvSpPr>
+          <p:cNvPr id="421" name="Google Shape;421;g270f6708402_0_6:notes"/>
+          <p:cNvSpPr/>
+          <p:nvPr>
+            <p:ph idx="2" type="sldImg"/>
+          </p:nvPr>
+        </p:nvSpPr>
+        <p:spPr>
+          <a:xfrm>
+            <a:off x="1143225" y="685800"/>
+            <a:ext cx="4572300" cy="3429000"/>
+          </a:xfrm>
+          <a:custGeom>
+            <a:rect b="b" l="l" r="r" t="t"/>
+            <a:pathLst>
+              <a:path extrusionOk="0" h="120000" w="120000">
+                <a:moveTo>
+                  <a:pt x="0" y="0"/>
+                </a:moveTo>
+                <a:lnTo>
+                  <a:pt x="120000" y="0"/>
+                </a:lnTo>
+                <a:lnTo>
+                  <a:pt x="120000" y="120000"/>
+                </a:lnTo>
+                <a:lnTo>
+                  <a:pt x="0" y="120000"/>
+                </a:lnTo>
+                <a:close/>
+              </a:path>
+            </a:pathLst>
+          </a:custGeom>
+        </p:spPr>
+      </p:sp>
+      <p:sp>
+        <p:nvSpPr>
+          <p:cNvPr id="422" name="Google Shape;422;g270f6708402_0_6:notes"/>
+          <p:cNvSpPr txBox="1"/>
+          <p:nvPr>
+            <p:ph idx="1" type="body"/>
+          </p:nvPr>
+        </p:nvSpPr>
+        <p:spPr>
+          <a:xfrm>
+            <a:off x="685800" y="4343400"/>
+            <a:ext cx="5486400" cy="4114800"/>
+          </a:xfrm>
+          <a:prstGeom prst="rect">
+            <a:avLst/>
+          </a:prstGeom>
+        </p:spPr>
+        <p:txBody>
+          <a:bodyPr anchorCtr="0" anchor="t" bIns="91425" lIns="91425" spcFirstLastPara="1" rIns="91425" wrap="square" tIns="91425">
+            <a:noAutofit/>
+          </a:bodyPr>
+          <a:lstStyle/>
+          <a:p>
+            <a:pPr indent="0" lvl="0" marL="0" rtl="0" algn="l">
+              <a:spcBef>
+                <a:spcPts val="0"/>
+              </a:spcBef>
+              <a:spcAft>
+                <a:spcPts val="0"/>
+              </a:spcAft>
+              <a:buNone/>
+            </a:pPr>
+            <a:r>
+              <a:t/>
+            </a:r>
+            <a:endParaRPr/>
+          </a:p>
+        </p:txBody>
+      </p:sp>
+    </p:spTree>
+  </p:cSld>
+  <p:clrMapOvr>
+    <a:masterClrMapping/>
+  </p:clrMapOvr>
+</p:notes>
+</file>
+
 <file path=ppt/notesSlides/notesSlide5.xml><?xml version="1.0" encoding="utf-8"?>
 <p:notes xmlns:a="http://schemas.openxmlformats.org/drawingml/2006/main" xmlns:r="http://schemas.openxmlformats.org/officeDocument/2006/relationships" xmlns:mc="http://schemas.openxmlformats.org/markup-compatibility/2006" xmlns:mv="urn:schemas-microsoft-com:mac:vml" xmlns:p="http://schemas.openxmlformats.org/presentationml/2006/main" xmlns:c="http://schemas.openxmlformats.org/drawingml/2006/chart" xmlns:dgm="http://schemas.openxmlformats.org/drawingml/2006/diagram" xmlns:o="urn:schemas-microsoft-com:office:office" xmlns:v="urn:schemas-microsoft-com:vml" xmlns:pvml="urn:schemas-microsoft-com:office:powerpoint" xmlns:com="http://schemas.openxmlformats.org/drawingml/2006/compatibility" xmlns:p14="http://schemas.microsoft.com/office/powerpoint/2010/main" xmlns:p15="http://schemas.microsoft.com/office/powerpoint/2012/main" xmlns:ahyp="http://schemas.microsoft.com/office/drawing/2018/hyperlinkcolor" showMasterPhAnim="0" showMasterSp="0">
   <p:cSld>
@@ -5614,6 +5837,602 @@
               <a:spcAft>
                 <a:spcPts val="0"/>
               </a:spcAft>
+              <a:buNone/>
+            </a:pPr>
+            <a:r>
+              <a:t/>
+            </a:r>
+            <a:endParaRPr/>
+          </a:p>
+        </p:txBody>
+      </p:sp>
+    </p:spTree>
+  </p:cSld>
+  <p:clrMapOvr>
+    <a:masterClrMapping/>
+  </p:clrMapOvr>
+</p:notes>
+</file>
+
+<file path=ppt/notesSlides/notesSlide50.xml><?xml version="1.0" encoding="utf-8"?>
+<p:notes xmlns:a="http://schemas.openxmlformats.org/drawingml/2006/main" xmlns:r="http://schemas.openxmlformats.org/officeDocument/2006/relationships" xmlns:mc="http://schemas.openxmlformats.org/markup-compatibility/2006" xmlns:mv="urn:schemas-microsoft-com:mac:vml" xmlns:p="http://schemas.openxmlformats.org/presentationml/2006/main" xmlns:c="http://schemas.openxmlformats.org/drawingml/2006/chart" xmlns:dgm="http://schemas.openxmlformats.org/drawingml/2006/diagram" xmlns:o="urn:schemas-microsoft-com:office:office" xmlns:v="urn:schemas-microsoft-com:vml" xmlns:pvml="urn:schemas-microsoft-com:office:powerpoint" xmlns:com="http://schemas.openxmlformats.org/drawingml/2006/compatibility" xmlns:p14="http://schemas.microsoft.com/office/powerpoint/2010/main" xmlns:p15="http://schemas.microsoft.com/office/powerpoint/2012/main" xmlns:ahyp="http://schemas.microsoft.com/office/drawing/2018/hyperlinkcolor" showMasterPhAnim="0" showMasterSp="0">
+  <p:cSld>
+    <p:spTree>
+      <p:nvGrpSpPr>
+        <p:cNvPr id="428" name="Shape 428"/>
+        <p:cNvGrpSpPr/>
+        <p:nvPr/>
+      </p:nvGrpSpPr>
+      <p:grpSpPr>
+        <a:xfrm>
+          <a:off x="0" y="0"/>
+          <a:ext cx="0" cy="0"/>
+          <a:chOff x="0" y="0"/>
+          <a:chExt cx="0" cy="0"/>
+        </a:xfrm>
+      </p:grpSpPr>
+      <p:sp>
+        <p:nvSpPr>
+          <p:cNvPr id="429" name="Google Shape;429;g270f6708402_0_14:notes"/>
+          <p:cNvSpPr/>
+          <p:nvPr>
+            <p:ph idx="2" type="sldImg"/>
+          </p:nvPr>
+        </p:nvSpPr>
+        <p:spPr>
+          <a:xfrm>
+            <a:off x="381000" y="685800"/>
+            <a:ext cx="6096000" cy="3429000"/>
+          </a:xfrm>
+          <a:custGeom>
+            <a:rect b="b" l="l" r="r" t="t"/>
+            <a:pathLst>
+              <a:path extrusionOk="0" h="120000" w="120000">
+                <a:moveTo>
+                  <a:pt x="0" y="0"/>
+                </a:moveTo>
+                <a:lnTo>
+                  <a:pt x="120000" y="0"/>
+                </a:lnTo>
+                <a:lnTo>
+                  <a:pt x="120000" y="120000"/>
+                </a:lnTo>
+                <a:lnTo>
+                  <a:pt x="0" y="120000"/>
+                </a:lnTo>
+                <a:close/>
+              </a:path>
+            </a:pathLst>
+          </a:custGeom>
+          <a:noFill/>
+          <a:ln cap="flat" cmpd="sng" w="9525">
+            <a:solidFill>
+              <a:srgbClr val="000000"/>
+            </a:solidFill>
+            <a:prstDash val="solid"/>
+            <a:round/>
+            <a:headEnd len="sm" w="sm" type="none"/>
+            <a:tailEnd len="sm" w="sm" type="none"/>
+          </a:ln>
+        </p:spPr>
+      </p:sp>
+      <p:sp>
+        <p:nvSpPr>
+          <p:cNvPr id="430" name="Google Shape;430;g270f6708402_0_14:notes"/>
+          <p:cNvSpPr txBox="1"/>
+          <p:nvPr>
+            <p:ph idx="1" type="body"/>
+          </p:nvPr>
+        </p:nvSpPr>
+        <p:spPr>
+          <a:xfrm>
+            <a:off x="685800" y="4343400"/>
+            <a:ext cx="5486400" cy="4114800"/>
+          </a:xfrm>
+          <a:prstGeom prst="rect">
+            <a:avLst/>
+          </a:prstGeom>
+          <a:noFill/>
+          <a:ln>
+            <a:noFill/>
+          </a:ln>
+        </p:spPr>
+        <p:txBody>
+          <a:bodyPr anchorCtr="0" anchor="t" bIns="91425" lIns="91425" spcFirstLastPara="1" rIns="91425" wrap="square" tIns="91425">
+            <a:noAutofit/>
+          </a:bodyPr>
+          <a:lstStyle/>
+          <a:p>
+            <a:pPr indent="0" lvl="0" marL="0" rtl="0" algn="l">
+              <a:lnSpc>
+                <a:spcPct val="100000"/>
+              </a:lnSpc>
+              <a:spcBef>
+                <a:spcPts val="0"/>
+              </a:spcBef>
+              <a:spcAft>
+                <a:spcPts val="0"/>
+              </a:spcAft>
+              <a:buSzPts val="1100"/>
+              <a:buNone/>
+            </a:pPr>
+            <a:r>
+              <a:rPr lang="en-US"/>
+              <a:t>Use examples e.g. students ages, hobbies, etc (from lesson 1 getting to know each other) as class structure,. Plus player characters in games (name, hit points, speed, armour etc…)</a:t>
+            </a:r>
+            <a:endParaRPr/>
+          </a:p>
+        </p:txBody>
+      </p:sp>
+    </p:spTree>
+  </p:cSld>
+  <p:clrMapOvr>
+    <a:masterClrMapping/>
+  </p:clrMapOvr>
+</p:notes>
+</file>
+
+<file path=ppt/notesSlides/notesSlide51.xml><?xml version="1.0" encoding="utf-8"?>
+<p:notes xmlns:a="http://schemas.openxmlformats.org/drawingml/2006/main" xmlns:r="http://schemas.openxmlformats.org/officeDocument/2006/relationships" xmlns:mc="http://schemas.openxmlformats.org/markup-compatibility/2006" xmlns:mv="urn:schemas-microsoft-com:mac:vml" xmlns:p="http://schemas.openxmlformats.org/presentationml/2006/main" xmlns:c="http://schemas.openxmlformats.org/drawingml/2006/chart" xmlns:dgm="http://schemas.openxmlformats.org/drawingml/2006/diagram" xmlns:o="urn:schemas-microsoft-com:office:office" xmlns:v="urn:schemas-microsoft-com:vml" xmlns:pvml="urn:schemas-microsoft-com:office:powerpoint" xmlns:com="http://schemas.openxmlformats.org/drawingml/2006/compatibility" xmlns:p14="http://schemas.microsoft.com/office/powerpoint/2010/main" xmlns:p15="http://schemas.microsoft.com/office/powerpoint/2012/main" xmlns:ahyp="http://schemas.microsoft.com/office/drawing/2018/hyperlinkcolor" showMasterPhAnim="0" showMasterSp="0">
+  <p:cSld>
+    <p:spTree>
+      <p:nvGrpSpPr>
+        <p:cNvPr id="436" name="Shape 436"/>
+        <p:cNvGrpSpPr/>
+        <p:nvPr/>
+      </p:nvGrpSpPr>
+      <p:grpSpPr>
+        <a:xfrm>
+          <a:off x="0" y="0"/>
+          <a:ext cx="0" cy="0"/>
+          <a:chOff x="0" y="0"/>
+          <a:chExt cx="0" cy="0"/>
+        </a:xfrm>
+      </p:grpSpPr>
+      <p:sp>
+        <p:nvSpPr>
+          <p:cNvPr id="437" name="Google Shape;437;g270f6708402_0_29:notes"/>
+          <p:cNvSpPr/>
+          <p:nvPr>
+            <p:ph idx="2" type="sldImg"/>
+          </p:nvPr>
+        </p:nvSpPr>
+        <p:spPr>
+          <a:xfrm>
+            <a:off x="381000" y="685800"/>
+            <a:ext cx="6096000" cy="3429000"/>
+          </a:xfrm>
+          <a:custGeom>
+            <a:rect b="b" l="l" r="r" t="t"/>
+            <a:pathLst>
+              <a:path extrusionOk="0" h="120000" w="120000">
+                <a:moveTo>
+                  <a:pt x="0" y="0"/>
+                </a:moveTo>
+                <a:lnTo>
+                  <a:pt x="120000" y="0"/>
+                </a:lnTo>
+                <a:lnTo>
+                  <a:pt x="120000" y="120000"/>
+                </a:lnTo>
+                <a:lnTo>
+                  <a:pt x="0" y="120000"/>
+                </a:lnTo>
+                <a:close/>
+              </a:path>
+            </a:pathLst>
+          </a:custGeom>
+          <a:noFill/>
+          <a:ln cap="flat" cmpd="sng" w="9525">
+            <a:solidFill>
+              <a:srgbClr val="000000"/>
+            </a:solidFill>
+            <a:prstDash val="solid"/>
+            <a:round/>
+            <a:headEnd len="sm" w="sm" type="none"/>
+            <a:tailEnd len="sm" w="sm" type="none"/>
+          </a:ln>
+        </p:spPr>
+      </p:sp>
+      <p:sp>
+        <p:nvSpPr>
+          <p:cNvPr id="438" name="Google Shape;438;g270f6708402_0_29:notes"/>
+          <p:cNvSpPr txBox="1"/>
+          <p:nvPr>
+            <p:ph idx="1" type="body"/>
+          </p:nvPr>
+        </p:nvSpPr>
+        <p:spPr>
+          <a:xfrm>
+            <a:off x="685800" y="4343400"/>
+            <a:ext cx="5486400" cy="4114800"/>
+          </a:xfrm>
+          <a:prstGeom prst="rect">
+            <a:avLst/>
+          </a:prstGeom>
+          <a:noFill/>
+          <a:ln>
+            <a:noFill/>
+          </a:ln>
+        </p:spPr>
+        <p:txBody>
+          <a:bodyPr anchorCtr="0" anchor="t" bIns="91425" lIns="91425" spcFirstLastPara="1" rIns="91425" wrap="square" tIns="91425">
+            <a:noAutofit/>
+          </a:bodyPr>
+          <a:lstStyle/>
+          <a:p>
+            <a:pPr indent="0" lvl="0" marL="0" rtl="0" algn="l">
+              <a:lnSpc>
+                <a:spcPct val="100000"/>
+              </a:lnSpc>
+              <a:spcBef>
+                <a:spcPts val="0"/>
+              </a:spcBef>
+              <a:spcAft>
+                <a:spcPts val="0"/>
+              </a:spcAft>
+              <a:buSzPts val="1100"/>
+              <a:buNone/>
+            </a:pPr>
+            <a:r>
+              <a:rPr lang="en-US"/>
+              <a:t>Use e.g. player character as an example for setting up </a:t>
+            </a:r>
+            <a:r>
+              <a:rPr lang="en-US"/>
+              <a:t>constructor</a:t>
+            </a:r>
+            <a:r>
+              <a:rPr lang="en-US"/>
+              <a:t>. Model is in chapter 16 of Arcade Academy.</a:t>
+            </a:r>
+            <a:endParaRPr/>
+          </a:p>
+        </p:txBody>
+      </p:sp>
+    </p:spTree>
+  </p:cSld>
+  <p:clrMapOvr>
+    <a:masterClrMapping/>
+  </p:clrMapOvr>
+</p:notes>
+</file>
+
+<file path=ppt/notesSlides/notesSlide52.xml><?xml version="1.0" encoding="utf-8"?>
+<p:notes xmlns:a="http://schemas.openxmlformats.org/drawingml/2006/main" xmlns:r="http://schemas.openxmlformats.org/officeDocument/2006/relationships" xmlns:mc="http://schemas.openxmlformats.org/markup-compatibility/2006" xmlns:mv="urn:schemas-microsoft-com:mac:vml" xmlns:p="http://schemas.openxmlformats.org/presentationml/2006/main" xmlns:c="http://schemas.openxmlformats.org/drawingml/2006/chart" xmlns:dgm="http://schemas.openxmlformats.org/drawingml/2006/diagram" xmlns:o="urn:schemas-microsoft-com:office:office" xmlns:v="urn:schemas-microsoft-com:vml" xmlns:pvml="urn:schemas-microsoft-com:office:powerpoint" xmlns:com="http://schemas.openxmlformats.org/drawingml/2006/compatibility" xmlns:p14="http://schemas.microsoft.com/office/powerpoint/2010/main" xmlns:p15="http://schemas.microsoft.com/office/powerpoint/2012/main" xmlns:ahyp="http://schemas.microsoft.com/office/drawing/2018/hyperlinkcolor" showMasterPhAnim="0" showMasterSp="0">
+  <p:cSld>
+    <p:spTree>
+      <p:nvGrpSpPr>
+        <p:cNvPr id="444" name="Shape 444"/>
+        <p:cNvGrpSpPr/>
+        <p:nvPr/>
+      </p:nvGrpSpPr>
+      <p:grpSpPr>
+        <a:xfrm>
+          <a:off x="0" y="0"/>
+          <a:ext cx="0" cy="0"/>
+          <a:chOff x="0" y="0"/>
+          <a:chExt cx="0" cy="0"/>
+        </a:xfrm>
+      </p:grpSpPr>
+      <p:sp>
+        <p:nvSpPr>
+          <p:cNvPr id="445" name="Google Shape;445;g270f6708402_0_36:notes"/>
+          <p:cNvSpPr/>
+          <p:nvPr>
+            <p:ph idx="2" type="sldImg"/>
+          </p:nvPr>
+        </p:nvSpPr>
+        <p:spPr>
+          <a:xfrm>
+            <a:off x="381000" y="685800"/>
+            <a:ext cx="6096000" cy="3429000"/>
+          </a:xfrm>
+          <a:custGeom>
+            <a:rect b="b" l="l" r="r" t="t"/>
+            <a:pathLst>
+              <a:path extrusionOk="0" h="120000" w="120000">
+                <a:moveTo>
+                  <a:pt x="0" y="0"/>
+                </a:moveTo>
+                <a:lnTo>
+                  <a:pt x="120000" y="0"/>
+                </a:lnTo>
+                <a:lnTo>
+                  <a:pt x="120000" y="120000"/>
+                </a:lnTo>
+                <a:lnTo>
+                  <a:pt x="0" y="120000"/>
+                </a:lnTo>
+                <a:close/>
+              </a:path>
+            </a:pathLst>
+          </a:custGeom>
+          <a:noFill/>
+          <a:ln cap="flat" cmpd="sng" w="9525">
+            <a:solidFill>
+              <a:srgbClr val="000000"/>
+            </a:solidFill>
+            <a:prstDash val="solid"/>
+            <a:round/>
+            <a:headEnd len="sm" w="sm" type="none"/>
+            <a:tailEnd len="sm" w="sm" type="none"/>
+          </a:ln>
+        </p:spPr>
+      </p:sp>
+      <p:sp>
+        <p:nvSpPr>
+          <p:cNvPr id="446" name="Google Shape;446;g270f6708402_0_36:notes"/>
+          <p:cNvSpPr txBox="1"/>
+          <p:nvPr>
+            <p:ph idx="1" type="body"/>
+          </p:nvPr>
+        </p:nvSpPr>
+        <p:spPr>
+          <a:xfrm>
+            <a:off x="685800" y="4343400"/>
+            <a:ext cx="5486400" cy="4114800"/>
+          </a:xfrm>
+          <a:prstGeom prst="rect">
+            <a:avLst/>
+          </a:prstGeom>
+          <a:noFill/>
+          <a:ln>
+            <a:noFill/>
+          </a:ln>
+        </p:spPr>
+        <p:txBody>
+          <a:bodyPr anchorCtr="0" anchor="t" bIns="91425" lIns="91425" spcFirstLastPara="1" rIns="91425" wrap="square" tIns="91425">
+            <a:noAutofit/>
+          </a:bodyPr>
+          <a:lstStyle/>
+          <a:p>
+            <a:pPr indent="0" lvl="0" marL="0" rtl="0" algn="l">
+              <a:lnSpc>
+                <a:spcPct val="100000"/>
+              </a:lnSpc>
+              <a:spcBef>
+                <a:spcPts val="0"/>
+              </a:spcBef>
+              <a:spcAft>
+                <a:spcPts val="0"/>
+              </a:spcAft>
+              <a:buSzPts val="1100"/>
+              <a:buNone/>
+            </a:pPr>
+            <a:r>
+              <a:rPr lang="en-US"/>
+              <a:t>Show Scratch to prove how this already incorporates OOP.</a:t>
+            </a:r>
+            <a:endParaRPr/>
+          </a:p>
+        </p:txBody>
+      </p:sp>
+    </p:spTree>
+  </p:cSld>
+  <p:clrMapOvr>
+    <a:masterClrMapping/>
+  </p:clrMapOvr>
+</p:notes>
+</file>
+
+<file path=ppt/notesSlides/notesSlide53.xml><?xml version="1.0" encoding="utf-8"?>
+<p:notes xmlns:a="http://schemas.openxmlformats.org/drawingml/2006/main" xmlns:r="http://schemas.openxmlformats.org/officeDocument/2006/relationships" xmlns:mc="http://schemas.openxmlformats.org/markup-compatibility/2006" xmlns:mv="urn:schemas-microsoft-com:mac:vml" xmlns:p="http://schemas.openxmlformats.org/presentationml/2006/main" xmlns:c="http://schemas.openxmlformats.org/drawingml/2006/chart" xmlns:dgm="http://schemas.openxmlformats.org/drawingml/2006/diagram" xmlns:o="urn:schemas-microsoft-com:office:office" xmlns:v="urn:schemas-microsoft-com:vml" xmlns:pvml="urn:schemas-microsoft-com:office:powerpoint" xmlns:com="http://schemas.openxmlformats.org/drawingml/2006/compatibility" xmlns:p14="http://schemas.microsoft.com/office/powerpoint/2010/main" xmlns:p15="http://schemas.microsoft.com/office/powerpoint/2012/main" xmlns:ahyp="http://schemas.microsoft.com/office/drawing/2018/hyperlinkcolor" showMasterPhAnim="0" showMasterSp="0">
+  <p:cSld>
+    <p:spTree>
+      <p:nvGrpSpPr>
+        <p:cNvPr id="452" name="Shape 452"/>
+        <p:cNvGrpSpPr/>
+        <p:nvPr/>
+      </p:nvGrpSpPr>
+      <p:grpSpPr>
+        <a:xfrm>
+          <a:off x="0" y="0"/>
+          <a:ext cx="0" cy="0"/>
+          <a:chOff x="0" y="0"/>
+          <a:chExt cx="0" cy="0"/>
+        </a:xfrm>
+      </p:grpSpPr>
+      <p:sp>
+        <p:nvSpPr>
+          <p:cNvPr id="453" name="Google Shape;453;g270f6708402_0_43:notes"/>
+          <p:cNvSpPr/>
+          <p:nvPr>
+            <p:ph idx="2" type="sldImg"/>
+          </p:nvPr>
+        </p:nvSpPr>
+        <p:spPr>
+          <a:xfrm>
+            <a:off x="381000" y="685800"/>
+            <a:ext cx="6096000" cy="3429000"/>
+          </a:xfrm>
+          <a:custGeom>
+            <a:rect b="b" l="l" r="r" t="t"/>
+            <a:pathLst>
+              <a:path extrusionOk="0" h="120000" w="120000">
+                <a:moveTo>
+                  <a:pt x="0" y="0"/>
+                </a:moveTo>
+                <a:lnTo>
+                  <a:pt x="120000" y="0"/>
+                </a:lnTo>
+                <a:lnTo>
+                  <a:pt x="120000" y="120000"/>
+                </a:lnTo>
+                <a:lnTo>
+                  <a:pt x="0" y="120000"/>
+                </a:lnTo>
+                <a:close/>
+              </a:path>
+            </a:pathLst>
+          </a:custGeom>
+          <a:noFill/>
+          <a:ln cap="flat" cmpd="sng" w="9525">
+            <a:solidFill>
+              <a:srgbClr val="000000"/>
+            </a:solidFill>
+            <a:prstDash val="solid"/>
+            <a:round/>
+            <a:headEnd len="sm" w="sm" type="none"/>
+            <a:tailEnd len="sm" w="sm" type="none"/>
+          </a:ln>
+        </p:spPr>
+      </p:sp>
+      <p:sp>
+        <p:nvSpPr>
+          <p:cNvPr id="454" name="Google Shape;454;g270f6708402_0_43:notes"/>
+          <p:cNvSpPr txBox="1"/>
+          <p:nvPr>
+            <p:ph idx="1" type="body"/>
+          </p:nvPr>
+        </p:nvSpPr>
+        <p:spPr>
+          <a:xfrm>
+            <a:off x="685800" y="4343400"/>
+            <a:ext cx="5486400" cy="4114800"/>
+          </a:xfrm>
+          <a:prstGeom prst="rect">
+            <a:avLst/>
+          </a:prstGeom>
+          <a:noFill/>
+          <a:ln>
+            <a:noFill/>
+          </a:ln>
+        </p:spPr>
+        <p:txBody>
+          <a:bodyPr anchorCtr="0" anchor="t" bIns="91425" lIns="91425" spcFirstLastPara="1" rIns="91425" wrap="square" tIns="91425">
+            <a:noAutofit/>
+          </a:bodyPr>
+          <a:lstStyle/>
+          <a:p>
+            <a:pPr indent="0" lvl="0" marL="0" rtl="0" algn="l">
+              <a:lnSpc>
+                <a:spcPct val="100000"/>
+              </a:lnSpc>
+              <a:spcBef>
+                <a:spcPts val="0"/>
+              </a:spcBef>
+              <a:spcAft>
+                <a:spcPts val="0"/>
+              </a:spcAft>
+              <a:buSzPts val="1100"/>
+              <a:buNone/>
+            </a:pPr>
+            <a:r>
+              <a:t/>
+            </a:r>
+            <a:endParaRPr/>
+          </a:p>
+        </p:txBody>
+      </p:sp>
+    </p:spTree>
+  </p:cSld>
+  <p:clrMapOvr>
+    <a:masterClrMapping/>
+  </p:clrMapOvr>
+</p:notes>
+</file>
+
+<file path=ppt/notesSlides/notesSlide54.xml><?xml version="1.0" encoding="utf-8"?>
+<p:notes xmlns:a="http://schemas.openxmlformats.org/drawingml/2006/main" xmlns:r="http://schemas.openxmlformats.org/officeDocument/2006/relationships" xmlns:mc="http://schemas.openxmlformats.org/markup-compatibility/2006" xmlns:mv="urn:schemas-microsoft-com:mac:vml" xmlns:p="http://schemas.openxmlformats.org/presentationml/2006/main" xmlns:c="http://schemas.openxmlformats.org/drawingml/2006/chart" xmlns:dgm="http://schemas.openxmlformats.org/drawingml/2006/diagram" xmlns:o="urn:schemas-microsoft-com:office:office" xmlns:v="urn:schemas-microsoft-com:vml" xmlns:pvml="urn:schemas-microsoft-com:office:powerpoint" xmlns:com="http://schemas.openxmlformats.org/drawingml/2006/compatibility" xmlns:p14="http://schemas.microsoft.com/office/powerpoint/2010/main" xmlns:p15="http://schemas.microsoft.com/office/powerpoint/2012/main" xmlns:ahyp="http://schemas.microsoft.com/office/drawing/2018/hyperlinkcolor" showMasterPhAnim="0" showMasterSp="0">
+  <p:cSld>
+    <p:spTree>
+      <p:nvGrpSpPr>
+        <p:cNvPr id="459" name="Shape 459"/>
+        <p:cNvGrpSpPr/>
+        <p:nvPr/>
+      </p:nvGrpSpPr>
+      <p:grpSpPr>
+        <a:xfrm>
+          <a:off x="0" y="0"/>
+          <a:ext cx="0" cy="0"/>
+          <a:chOff x="0" y="0"/>
+          <a:chExt cx="0" cy="0"/>
+        </a:xfrm>
+      </p:grpSpPr>
+      <p:sp>
+        <p:nvSpPr>
+          <p:cNvPr id="460" name="Google Shape;460;g270f6708402_0_21:notes"/>
+          <p:cNvSpPr/>
+          <p:nvPr>
+            <p:ph idx="2" type="sldImg"/>
+          </p:nvPr>
+        </p:nvSpPr>
+        <p:spPr>
+          <a:xfrm>
+            <a:off x="381000" y="685800"/>
+            <a:ext cx="6096000" cy="3429000"/>
+          </a:xfrm>
+          <a:custGeom>
+            <a:rect b="b" l="l" r="r" t="t"/>
+            <a:pathLst>
+              <a:path extrusionOk="0" h="120000" w="120000">
+                <a:moveTo>
+                  <a:pt x="0" y="0"/>
+                </a:moveTo>
+                <a:lnTo>
+                  <a:pt x="120000" y="0"/>
+                </a:lnTo>
+                <a:lnTo>
+                  <a:pt x="120000" y="120000"/>
+                </a:lnTo>
+                <a:lnTo>
+                  <a:pt x="0" y="120000"/>
+                </a:lnTo>
+                <a:close/>
+              </a:path>
+            </a:pathLst>
+          </a:custGeom>
+          <a:noFill/>
+          <a:ln cap="flat" cmpd="sng" w="9525">
+            <a:solidFill>
+              <a:srgbClr val="000000"/>
+            </a:solidFill>
+            <a:prstDash val="solid"/>
+            <a:round/>
+            <a:headEnd len="sm" w="sm" type="none"/>
+            <a:tailEnd len="sm" w="sm" type="none"/>
+          </a:ln>
+        </p:spPr>
+      </p:sp>
+      <p:sp>
+        <p:nvSpPr>
+          <p:cNvPr id="461" name="Google Shape;461;g270f6708402_0_21:notes"/>
+          <p:cNvSpPr txBox="1"/>
+          <p:nvPr>
+            <p:ph idx="1" type="body"/>
+          </p:nvPr>
+        </p:nvSpPr>
+        <p:spPr>
+          <a:xfrm>
+            <a:off x="685800" y="4343400"/>
+            <a:ext cx="5486400" cy="4114800"/>
+          </a:xfrm>
+          <a:prstGeom prst="rect">
+            <a:avLst/>
+          </a:prstGeom>
+          <a:noFill/>
+          <a:ln>
+            <a:noFill/>
+          </a:ln>
+        </p:spPr>
+        <p:txBody>
+          <a:bodyPr anchorCtr="0" anchor="t" bIns="91425" lIns="91425" spcFirstLastPara="1" rIns="91425" wrap="square" tIns="91425">
+            <a:noAutofit/>
+          </a:bodyPr>
+          <a:lstStyle/>
+          <a:p>
+            <a:pPr indent="0" lvl="0" marL="0" rtl="0" algn="l">
+              <a:lnSpc>
+                <a:spcPct val="100000"/>
+              </a:lnSpc>
+              <a:spcBef>
+                <a:spcPts val="0"/>
+              </a:spcBef>
+              <a:spcAft>
+                <a:spcPts val="0"/>
+              </a:spcAft>
+              <a:buSzPts val="1100"/>
               <a:buNone/>
             </a:pPr>
             <a:r>
@@ -30605,6 +31424,847 @@
 </p:sld>
 </file>
 
+<file path=ppt/slides/slide48.xml><?xml version="1.0" encoding="utf-8"?>
+<p:sld xmlns:a="http://schemas.openxmlformats.org/drawingml/2006/main" xmlns:r="http://schemas.openxmlformats.org/officeDocument/2006/relationships" xmlns:mc="http://schemas.openxmlformats.org/markup-compatibility/2006" xmlns:mv="urn:schemas-microsoft-com:mac:vml" xmlns:p="http://schemas.openxmlformats.org/presentationml/2006/main" xmlns:c="http://schemas.openxmlformats.org/drawingml/2006/chart" xmlns:dgm="http://schemas.openxmlformats.org/drawingml/2006/diagram" xmlns:o="urn:schemas-microsoft-com:office:office" xmlns:v="urn:schemas-microsoft-com:vml" xmlns:pvml="urn:schemas-microsoft-com:office:powerpoint" xmlns:com="http://schemas.openxmlformats.org/drawingml/2006/compatibility" xmlns:p14="http://schemas.microsoft.com/office/powerpoint/2010/main" xmlns:p15="http://schemas.microsoft.com/office/powerpoint/2012/main" xmlns:ahyp="http://schemas.microsoft.com/office/drawing/2018/hyperlinkcolor">
+  <p:cSld>
+    <p:spTree>
+      <p:nvGrpSpPr>
+        <p:cNvPr id="416" name="Shape 416"/>
+        <p:cNvGrpSpPr/>
+        <p:nvPr/>
+      </p:nvGrpSpPr>
+      <p:grpSpPr>
+        <a:xfrm>
+          <a:off x="0" y="0"/>
+          <a:ext cx="0" cy="0"/>
+          <a:chOff x="0" y="0"/>
+          <a:chExt cx="0" cy="0"/>
+        </a:xfrm>
+      </p:grpSpPr>
+      <p:sp>
+        <p:nvSpPr>
+          <p:cNvPr id="417" name="Google Shape;417;p55"/>
+          <p:cNvSpPr txBox="1"/>
+          <p:nvPr>
+            <p:ph idx="1" type="body"/>
+          </p:nvPr>
+        </p:nvSpPr>
+        <p:spPr>
+          <a:xfrm>
+            <a:off x="3228200" y="4448425"/>
+            <a:ext cx="12156000" cy="4726500"/>
+          </a:xfrm>
+          <a:prstGeom prst="rect">
+            <a:avLst/>
+          </a:prstGeom>
+          <a:noFill/>
+          <a:ln>
+            <a:noFill/>
+          </a:ln>
+        </p:spPr>
+        <p:txBody>
+          <a:bodyPr anchorCtr="0" anchor="t" bIns="91425" lIns="91425" spcFirstLastPara="1" rIns="91425" wrap="square" tIns="91425">
+            <a:noAutofit/>
+          </a:bodyPr>
+          <a:lstStyle/>
+          <a:p>
+            <a:pPr indent="-419100" lvl="0" marL="457200" rtl="0" algn="l">
+              <a:spcBef>
+                <a:spcPts val="600"/>
+              </a:spcBef>
+              <a:spcAft>
+                <a:spcPts val="0"/>
+              </a:spcAft>
+              <a:buSzPts val="3000"/>
+              <a:buChar char="●"/>
+            </a:pPr>
+            <a:r>
+              <a:rPr lang="en-US"/>
+              <a:t>We will learn how to draw to the screen using Python Arcade functions</a:t>
+            </a:r>
+            <a:endParaRPr/>
+          </a:p>
+          <a:p>
+            <a:pPr indent="-419100" lvl="0" marL="457200" rtl="0" algn="l">
+              <a:spcBef>
+                <a:spcPts val="0"/>
+              </a:spcBef>
+              <a:spcAft>
+                <a:spcPts val="0"/>
+              </a:spcAft>
+              <a:buSzPts val="3000"/>
+              <a:buChar char="●"/>
+            </a:pPr>
+            <a:r>
+              <a:rPr lang="en-US"/>
+              <a:t>We will learn about Classes and Objects</a:t>
+            </a:r>
+            <a:r>
+              <a:rPr lang="en-US"/>
+              <a:t> - Object Oriented Programming</a:t>
+            </a:r>
+            <a:endParaRPr/>
+          </a:p>
+          <a:p>
+            <a:pPr indent="-419100" lvl="0" marL="457200" rtl="0" algn="l">
+              <a:spcBef>
+                <a:spcPts val="0"/>
+              </a:spcBef>
+              <a:spcAft>
+                <a:spcPts val="0"/>
+              </a:spcAft>
+              <a:buSzPts val="3000"/>
+              <a:buChar char="●"/>
+            </a:pPr>
+            <a:r>
+              <a:rPr lang="en-US"/>
+              <a:t>We will use these to create a text based adventure game</a:t>
+            </a:r>
+            <a:endParaRPr/>
+          </a:p>
+        </p:txBody>
+      </p:sp>
+      <p:sp>
+        <p:nvSpPr>
+          <p:cNvPr id="418" name="Google Shape;418;p55"/>
+          <p:cNvSpPr txBox="1"/>
+          <p:nvPr>
+            <p:ph idx="12" type="sldNum"/>
+          </p:nvPr>
+        </p:nvSpPr>
+        <p:spPr>
+          <a:xfrm>
+            <a:off x="15965075" y="9636275"/>
+            <a:ext cx="1673100" cy="650700"/>
+          </a:xfrm>
+          <a:prstGeom prst="rect">
+            <a:avLst/>
+          </a:prstGeom>
+          <a:noFill/>
+          <a:ln>
+            <a:noFill/>
+          </a:ln>
+        </p:spPr>
+        <p:txBody>
+          <a:bodyPr anchorCtr="0" anchor="t" bIns="91425" lIns="91425" spcFirstLastPara="1" rIns="91425" wrap="square" tIns="91425">
+            <a:noAutofit/>
+          </a:bodyPr>
+          <a:lstStyle/>
+          <a:p>
+            <a:pPr indent="0" lvl="0" marL="0" rtl="0" algn="l">
+              <a:lnSpc>
+                <a:spcPct val="100000"/>
+              </a:lnSpc>
+              <a:spcBef>
+                <a:spcPts val="0"/>
+              </a:spcBef>
+              <a:spcAft>
+                <a:spcPts val="0"/>
+              </a:spcAft>
+              <a:buSzPts val="1400"/>
+              <a:buNone/>
+            </a:pPr>
+            <a:fld id="{00000000-1234-1234-1234-123412341234}" type="slidenum">
+              <a:rPr lang="en-US"/>
+              <a:t>‹#›</a:t>
+            </a:fld>
+            <a:endParaRPr/>
+          </a:p>
+        </p:txBody>
+      </p:sp>
+      <p:sp>
+        <p:nvSpPr>
+          <p:cNvPr id="419" name="Google Shape;419;p55"/>
+          <p:cNvSpPr txBox="1"/>
+          <p:nvPr>
+            <p:ph idx="2" type="sldNum"/>
+          </p:nvPr>
+        </p:nvSpPr>
+        <p:spPr>
+          <a:xfrm>
+            <a:off x="969275" y="0"/>
+            <a:ext cx="1673100" cy="650700"/>
+          </a:xfrm>
+          <a:prstGeom prst="rect">
+            <a:avLst/>
+          </a:prstGeom>
+          <a:noFill/>
+          <a:ln>
+            <a:noFill/>
+          </a:ln>
+        </p:spPr>
+        <p:txBody>
+          <a:bodyPr anchorCtr="0" anchor="t" bIns="167625" lIns="167625" spcFirstLastPara="1" rIns="167625" wrap="square" tIns="167625">
+            <a:noAutofit/>
+          </a:bodyPr>
+          <a:lstStyle/>
+          <a:p>
+            <a:pPr indent="0" lvl="0" marL="0" rtl="0" algn="l">
+              <a:lnSpc>
+                <a:spcPct val="100000"/>
+              </a:lnSpc>
+              <a:spcBef>
+                <a:spcPts val="0"/>
+              </a:spcBef>
+              <a:spcAft>
+                <a:spcPts val="0"/>
+              </a:spcAft>
+              <a:buSzPts val="1800"/>
+              <a:buNone/>
+            </a:pPr>
+            <a:r>
+              <a:rPr lang="en-US"/>
+              <a:t>Slide </a:t>
+            </a:r>
+            <a:fld id="{00000000-1234-1234-1234-123412341234}" type="slidenum">
+              <a:rPr lang="en-US"/>
+              <a:t>‹#›</a:t>
+            </a:fld>
+            <a:endParaRPr/>
+          </a:p>
+        </p:txBody>
+      </p:sp>
+    </p:spTree>
+  </p:cSld>
+  <p:clrMapOvr>
+    <a:masterClrMapping/>
+  </p:clrMapOvr>
+  <p:timing>
+    <p:tnLst>
+      <p:par>
+        <p:cTn dur="indefinite" nodeType="tmRoot" restart="never">
+          <p:childTnLst>
+            <p:seq concurrent="1" nextAc="seek">
+              <p:cTn dur="indefinite" id="2" nodeType="mainSeq">
+                <p:childTnLst>
+                  <p:par>
+                    <p:cTn fill="hold">
+                      <p:stCondLst>
+                        <p:cond delay="indefinite"/>
+                      </p:stCondLst>
+                      <p:childTnLst>
+                        <p:par>
+                          <p:cTn fill="hold">
+                            <p:stCondLst>
+                              <p:cond delay="0"/>
+                            </p:stCondLst>
+                            <p:childTnLst>
+                              <p:par>
+                                <p:cTn fill="hold" nodeType="clickEffect" presetClass="entr" presetID="1" presetSubtype="0">
+                                  <p:stCondLst>
+                                    <p:cond delay="0"/>
+                                  </p:stCondLst>
+                                  <p:childTnLst>
+                                    <p:set>
+                                      <p:cBhvr>
+                                        <p:cTn dur="1" fill="hold">
+                                          <p:stCondLst>
+                                            <p:cond delay="0"/>
+                                          </p:stCondLst>
+                                        </p:cTn>
+                                        <p:tgtEl>
+                                          <p:spTgt spid="417">
+                                            <p:txEl>
+                                              <p:pRg end="0" st="0"/>
+                                            </p:txEl>
+                                          </p:spTgt>
+                                        </p:tgtEl>
+                                        <p:attrNameLst>
+                                          <p:attrName>style.visibility</p:attrName>
+                                        </p:attrNameLst>
+                                      </p:cBhvr>
+                                      <p:to>
+                                        <p:strVal val="visible"/>
+                                      </p:to>
+                                    </p:set>
+                                  </p:childTnLst>
+                                </p:cTn>
+                              </p:par>
+                            </p:childTnLst>
+                          </p:cTn>
+                        </p:par>
+                      </p:childTnLst>
+                    </p:cTn>
+                  </p:par>
+                  <p:par>
+                    <p:cTn fill="hold">
+                      <p:stCondLst>
+                        <p:cond delay="indefinite"/>
+                      </p:stCondLst>
+                      <p:childTnLst>
+                        <p:par>
+                          <p:cTn fill="hold">
+                            <p:stCondLst>
+                              <p:cond delay="0"/>
+                            </p:stCondLst>
+                            <p:childTnLst>
+                              <p:par>
+                                <p:cTn fill="hold" nodeType="clickEffect" presetClass="entr" presetID="1" presetSubtype="0">
+                                  <p:stCondLst>
+                                    <p:cond delay="0"/>
+                                  </p:stCondLst>
+                                  <p:childTnLst>
+                                    <p:set>
+                                      <p:cBhvr>
+                                        <p:cTn dur="1" fill="hold">
+                                          <p:stCondLst>
+                                            <p:cond delay="0"/>
+                                          </p:stCondLst>
+                                        </p:cTn>
+                                        <p:tgtEl>
+                                          <p:spTgt spid="417">
+                                            <p:txEl>
+                                              <p:pRg end="1" st="1"/>
+                                            </p:txEl>
+                                          </p:spTgt>
+                                        </p:tgtEl>
+                                        <p:attrNameLst>
+                                          <p:attrName>style.visibility</p:attrName>
+                                        </p:attrNameLst>
+                                      </p:cBhvr>
+                                      <p:to>
+                                        <p:strVal val="visible"/>
+                                      </p:to>
+                                    </p:set>
+                                  </p:childTnLst>
+                                </p:cTn>
+                              </p:par>
+                            </p:childTnLst>
+                          </p:cTn>
+                        </p:par>
+                      </p:childTnLst>
+                    </p:cTn>
+                  </p:par>
+                  <p:par>
+                    <p:cTn fill="hold">
+                      <p:stCondLst>
+                        <p:cond delay="indefinite"/>
+                      </p:stCondLst>
+                      <p:childTnLst>
+                        <p:par>
+                          <p:cTn fill="hold">
+                            <p:stCondLst>
+                              <p:cond delay="0"/>
+                            </p:stCondLst>
+                            <p:childTnLst>
+                              <p:par>
+                                <p:cTn fill="hold" nodeType="clickEffect" presetClass="entr" presetID="1" presetSubtype="0">
+                                  <p:stCondLst>
+                                    <p:cond delay="0"/>
+                                  </p:stCondLst>
+                                  <p:childTnLst>
+                                    <p:set>
+                                      <p:cBhvr>
+                                        <p:cTn dur="1" fill="hold">
+                                          <p:stCondLst>
+                                            <p:cond delay="0"/>
+                                          </p:stCondLst>
+                                        </p:cTn>
+                                        <p:tgtEl>
+                                          <p:spTgt spid="417">
+                                            <p:txEl>
+                                              <p:pRg end="2" st="2"/>
+                                            </p:txEl>
+                                          </p:spTgt>
+                                        </p:tgtEl>
+                                        <p:attrNameLst>
+                                          <p:attrName>style.visibility</p:attrName>
+                                        </p:attrNameLst>
+                                      </p:cBhvr>
+                                      <p:to>
+                                        <p:strVal val="visible"/>
+                                      </p:to>
+                                    </p:set>
+                                  </p:childTnLst>
+                                </p:cTn>
+                              </p:par>
+                            </p:childTnLst>
+                          </p:cTn>
+                        </p:par>
+                      </p:childTnLst>
+                    </p:cTn>
+                  </p:par>
+                </p:childTnLst>
+              </p:cTn>
+              <p:prevCondLst>
+                <p:cond evt="onPrev">
+                  <p:tgtEl>
+                    <p:sldTgt/>
+                  </p:tgtEl>
+                </p:cond>
+              </p:prevCondLst>
+              <p:nextCondLst>
+                <p:cond evt="onNext">
+                  <p:tgtEl>
+                    <p:sldTgt/>
+                  </p:tgtEl>
+                </p:cond>
+              </p:nextCondLst>
+            </p:seq>
+          </p:childTnLst>
+        </p:cTn>
+      </p:par>
+    </p:tnLst>
+  </p:timing>
+</p:sld>
+</file>
+
+<file path=ppt/slides/slide49.xml><?xml version="1.0" encoding="utf-8"?>
+<p:sld xmlns:a="http://schemas.openxmlformats.org/drawingml/2006/main" xmlns:r="http://schemas.openxmlformats.org/officeDocument/2006/relationships" xmlns:mc="http://schemas.openxmlformats.org/markup-compatibility/2006" xmlns:mv="urn:schemas-microsoft-com:mac:vml" xmlns:p="http://schemas.openxmlformats.org/presentationml/2006/main" xmlns:c="http://schemas.openxmlformats.org/drawingml/2006/chart" xmlns:dgm="http://schemas.openxmlformats.org/drawingml/2006/diagram" xmlns:o="urn:schemas-microsoft-com:office:office" xmlns:v="urn:schemas-microsoft-com:vml" xmlns:pvml="urn:schemas-microsoft-com:office:powerpoint" xmlns:com="http://schemas.openxmlformats.org/drawingml/2006/compatibility" xmlns:p14="http://schemas.microsoft.com/office/powerpoint/2010/main" xmlns:p15="http://schemas.microsoft.com/office/powerpoint/2012/main" xmlns:ahyp="http://schemas.microsoft.com/office/drawing/2018/hyperlinkcolor">
+  <p:cSld>
+    <p:spTree>
+      <p:nvGrpSpPr>
+        <p:cNvPr id="423" name="Shape 423"/>
+        <p:cNvGrpSpPr/>
+        <p:nvPr/>
+      </p:nvGrpSpPr>
+      <p:grpSpPr>
+        <a:xfrm>
+          <a:off x="0" y="0"/>
+          <a:ext cx="0" cy="0"/>
+          <a:chOff x="0" y="0"/>
+          <a:chExt cx="0" cy="0"/>
+        </a:xfrm>
+      </p:grpSpPr>
+      <p:sp>
+        <p:nvSpPr>
+          <p:cNvPr id="424" name="Google Shape;424;p56"/>
+          <p:cNvSpPr txBox="1"/>
+          <p:nvPr>
+            <p:ph type="title"/>
+          </p:nvPr>
+        </p:nvSpPr>
+        <p:spPr>
+          <a:xfrm>
+            <a:off x="2984700" y="1807300"/>
+            <a:ext cx="12137700" cy="738900"/>
+          </a:xfrm>
+          <a:prstGeom prst="rect">
+            <a:avLst/>
+          </a:prstGeom>
+        </p:spPr>
+        <p:txBody>
+          <a:bodyPr anchorCtr="0" anchor="t" bIns="91425" lIns="91425" spcFirstLastPara="1" rIns="91425" wrap="square" tIns="91425">
+            <a:spAutoFit/>
+          </a:bodyPr>
+          <a:lstStyle/>
+          <a:p>
+            <a:pPr indent="0" lvl="0" marL="0" rtl="0" algn="ctr">
+              <a:spcBef>
+                <a:spcPts val="0"/>
+              </a:spcBef>
+              <a:spcAft>
+                <a:spcPts val="0"/>
+              </a:spcAft>
+              <a:buNone/>
+            </a:pPr>
+            <a:r>
+              <a:rPr lang="en-US" sz="3600"/>
+              <a:t>Using the Learn Arcade Tutorial</a:t>
+            </a:r>
+            <a:endParaRPr sz="3600"/>
+          </a:p>
+        </p:txBody>
+      </p:sp>
+      <p:sp>
+        <p:nvSpPr>
+          <p:cNvPr id="425" name="Google Shape;425;p56"/>
+          <p:cNvSpPr/>
+          <p:nvPr>
+            <p:ph idx="3" type="pic"/>
+          </p:nvPr>
+        </p:nvSpPr>
+        <p:spPr>
+          <a:xfrm>
+            <a:off x="16017425" y="1039725"/>
+            <a:ext cx="1343700" cy="1312800"/>
+          </a:xfrm>
+          <a:prstGeom prst="ellipse">
+            <a:avLst/>
+          </a:prstGeom>
+        </p:spPr>
+      </p:sp>
+      <p:sp>
+        <p:nvSpPr>
+          <p:cNvPr id="426" name="Google Shape;426;p56"/>
+          <p:cNvSpPr txBox="1"/>
+          <p:nvPr>
+            <p:ph idx="12" type="sldNum"/>
+          </p:nvPr>
+        </p:nvSpPr>
+        <p:spPr>
+          <a:xfrm>
+            <a:off x="969275" y="0"/>
+            <a:ext cx="1673100" cy="650700"/>
+          </a:xfrm>
+          <a:prstGeom prst="rect">
+            <a:avLst/>
+          </a:prstGeom>
+        </p:spPr>
+        <p:txBody>
+          <a:bodyPr anchorCtr="0" anchor="t" bIns="167625" lIns="167625" spcFirstLastPara="1" rIns="167625" wrap="square" tIns="167625">
+            <a:noAutofit/>
+          </a:bodyPr>
+          <a:lstStyle/>
+          <a:p>
+            <a:pPr indent="0" lvl="0" marL="0" rtl="0" algn="l">
+              <a:spcBef>
+                <a:spcPts val="0"/>
+              </a:spcBef>
+              <a:spcAft>
+                <a:spcPts val="0"/>
+              </a:spcAft>
+              <a:buNone/>
+            </a:pPr>
+            <a:r>
+              <a:rPr lang="en-US"/>
+              <a:t>Slide </a:t>
+            </a:r>
+            <a:fld id="{00000000-1234-1234-1234-123412341234}" type="slidenum">
+              <a:rPr lang="en-US"/>
+              <a:t>‹#›</a:t>
+            </a:fld>
+            <a:endParaRPr/>
+          </a:p>
+        </p:txBody>
+      </p:sp>
+      <p:sp>
+        <p:nvSpPr>
+          <p:cNvPr id="427" name="Google Shape;427;p56"/>
+          <p:cNvSpPr txBox="1"/>
+          <p:nvPr/>
+        </p:nvSpPr>
+        <p:spPr>
+          <a:xfrm>
+            <a:off x="4657950" y="3922500"/>
+            <a:ext cx="8791200" cy="3853200"/>
+          </a:xfrm>
+          <a:prstGeom prst="rect">
+            <a:avLst/>
+          </a:prstGeom>
+          <a:noFill/>
+          <a:ln>
+            <a:noFill/>
+          </a:ln>
+        </p:spPr>
+        <p:txBody>
+          <a:bodyPr anchorCtr="0" anchor="t" bIns="91425" lIns="91425" spcFirstLastPara="1" rIns="91425" wrap="square" tIns="91425">
+            <a:spAutoFit/>
+          </a:bodyPr>
+          <a:lstStyle/>
+          <a:p>
+            <a:pPr indent="-355600" lvl="1" marL="914400" rtl="0" algn="l">
+              <a:lnSpc>
+                <a:spcPct val="90000"/>
+              </a:lnSpc>
+              <a:spcBef>
+                <a:spcPts val="1000"/>
+              </a:spcBef>
+              <a:spcAft>
+                <a:spcPts val="0"/>
+              </a:spcAft>
+              <a:buClr>
+                <a:schemeClr val="dk1"/>
+              </a:buClr>
+              <a:buSzPts val="2000"/>
+              <a:buFont typeface="Fredoka"/>
+              <a:buChar char="○"/>
+            </a:pPr>
+            <a:r>
+              <a:rPr lang="en-US" sz="2000">
+                <a:solidFill>
+                  <a:schemeClr val="dk1"/>
+                </a:solidFill>
+                <a:latin typeface="Fredoka"/>
+                <a:ea typeface="Fredoka"/>
+                <a:cs typeface="Fredoka"/>
+                <a:sym typeface="Fredoka"/>
+              </a:rPr>
+              <a:t>the tutorial is split into “chapters” which contain the information and “labs” which are practice exercises for you to code</a:t>
+            </a:r>
+            <a:endParaRPr sz="2000">
+              <a:solidFill>
+                <a:schemeClr val="dk1"/>
+              </a:solidFill>
+              <a:latin typeface="Fredoka"/>
+              <a:ea typeface="Fredoka"/>
+              <a:cs typeface="Fredoka"/>
+              <a:sym typeface="Fredoka"/>
+            </a:endParaRPr>
+          </a:p>
+          <a:p>
+            <a:pPr indent="-355600" lvl="1" marL="914400" rtl="0" algn="l">
+              <a:lnSpc>
+                <a:spcPct val="90000"/>
+              </a:lnSpc>
+              <a:spcBef>
+                <a:spcPts val="1000"/>
+              </a:spcBef>
+              <a:spcAft>
+                <a:spcPts val="0"/>
+              </a:spcAft>
+              <a:buClr>
+                <a:schemeClr val="dk1"/>
+              </a:buClr>
+              <a:buSzPts val="2000"/>
+              <a:buFont typeface="Fredoka"/>
+              <a:buChar char="○"/>
+            </a:pPr>
+            <a:r>
+              <a:rPr lang="en-US" sz="2000">
+                <a:solidFill>
+                  <a:schemeClr val="dk1"/>
+                </a:solidFill>
+                <a:latin typeface="Fredoka"/>
+                <a:ea typeface="Fredoka"/>
+                <a:cs typeface="Fredoka"/>
+                <a:sym typeface="Fredoka"/>
+              </a:rPr>
+              <a:t>let’s follow along with “5. How to Draw with Your Computer” chapter</a:t>
+            </a:r>
+            <a:endParaRPr sz="2000">
+              <a:solidFill>
+                <a:schemeClr val="dk1"/>
+              </a:solidFill>
+              <a:latin typeface="Fredoka"/>
+              <a:ea typeface="Fredoka"/>
+              <a:cs typeface="Fredoka"/>
+              <a:sym typeface="Fredoka"/>
+            </a:endParaRPr>
+          </a:p>
+          <a:p>
+            <a:pPr indent="-355600" lvl="1" marL="914400" rtl="0" algn="l">
+              <a:lnSpc>
+                <a:spcPct val="90000"/>
+              </a:lnSpc>
+              <a:spcBef>
+                <a:spcPts val="1000"/>
+              </a:spcBef>
+              <a:spcAft>
+                <a:spcPts val="0"/>
+              </a:spcAft>
+              <a:buClr>
+                <a:schemeClr val="dk1"/>
+              </a:buClr>
+              <a:buSzPts val="2000"/>
+              <a:buFont typeface="Fredoka"/>
+              <a:buChar char="○"/>
+            </a:pPr>
+            <a:r>
+              <a:rPr lang="en-US" sz="2000">
+                <a:solidFill>
+                  <a:schemeClr val="dk1"/>
+                </a:solidFill>
+                <a:latin typeface="Fredoka"/>
+                <a:ea typeface="Fredoka"/>
+                <a:cs typeface="Fredoka"/>
+                <a:sym typeface="Fredoka"/>
+              </a:rPr>
+              <a:t>at home you can open the Lab_2.py file and draw your own picture</a:t>
+            </a:r>
+            <a:endParaRPr sz="2000">
+              <a:solidFill>
+                <a:schemeClr val="dk1"/>
+              </a:solidFill>
+              <a:latin typeface="Fredoka"/>
+              <a:ea typeface="Fredoka"/>
+              <a:cs typeface="Fredoka"/>
+              <a:sym typeface="Fredoka"/>
+            </a:endParaRPr>
+          </a:p>
+          <a:p>
+            <a:pPr indent="-355600" lvl="1" marL="914400" rtl="0" algn="l">
+              <a:lnSpc>
+                <a:spcPct val="90000"/>
+              </a:lnSpc>
+              <a:spcBef>
+                <a:spcPts val="1000"/>
+              </a:spcBef>
+              <a:spcAft>
+                <a:spcPts val="0"/>
+              </a:spcAft>
+              <a:buClr>
+                <a:schemeClr val="dk1"/>
+              </a:buClr>
+              <a:buSzPts val="2000"/>
+              <a:buFont typeface="Fredoka"/>
+              <a:buChar char="○"/>
+            </a:pPr>
+            <a:r>
+              <a:rPr lang="en-US" sz="2000">
+                <a:solidFill>
+                  <a:schemeClr val="dk1"/>
+                </a:solidFill>
+                <a:latin typeface="Fredoka"/>
+                <a:ea typeface="Fredoka"/>
+                <a:cs typeface="Fredoka"/>
+                <a:sym typeface="Fredoka"/>
+              </a:rPr>
+              <a:t>Note that you can look up how to use all the Arcade functions at </a:t>
+            </a:r>
+            <a:r>
+              <a:rPr lang="en-US" sz="2000">
+                <a:solidFill>
+                  <a:schemeClr val="dk1"/>
+                </a:solidFill>
+                <a:latin typeface="Fredoka"/>
+                <a:ea typeface="Fredoka"/>
+                <a:cs typeface="Fredoka"/>
+                <a:sym typeface="Fredoka"/>
+              </a:rPr>
+              <a:t>this</a:t>
+            </a:r>
+            <a:r>
+              <a:rPr lang="en-US" sz="2000">
+                <a:solidFill>
+                  <a:schemeClr val="dk1"/>
+                </a:solidFill>
+                <a:latin typeface="Fredoka"/>
+                <a:ea typeface="Fredoka"/>
+                <a:cs typeface="Fredoka"/>
+                <a:sym typeface="Fredoka"/>
+              </a:rPr>
+              <a:t> address:</a:t>
+            </a:r>
+            <a:endParaRPr sz="2000">
+              <a:solidFill>
+                <a:schemeClr val="dk1"/>
+              </a:solidFill>
+              <a:latin typeface="Fredoka"/>
+              <a:ea typeface="Fredoka"/>
+              <a:cs typeface="Fredoka"/>
+              <a:sym typeface="Fredoka"/>
+            </a:endParaRPr>
+          </a:p>
+          <a:p>
+            <a:pPr indent="-355600" lvl="2" marL="1371600" rtl="0" algn="l">
+              <a:lnSpc>
+                <a:spcPct val="90000"/>
+              </a:lnSpc>
+              <a:spcBef>
+                <a:spcPts val="1000"/>
+              </a:spcBef>
+              <a:spcAft>
+                <a:spcPts val="0"/>
+              </a:spcAft>
+              <a:buClr>
+                <a:schemeClr val="dk1"/>
+              </a:buClr>
+              <a:buSzPts val="2000"/>
+              <a:buFont typeface="Fredoka"/>
+              <a:buChar char="■"/>
+            </a:pPr>
+            <a:r>
+              <a:rPr lang="en-US" sz="2000" u="sng">
+                <a:solidFill>
+                  <a:schemeClr val="hlink"/>
+                </a:solidFill>
+                <a:latin typeface="Fredoka"/>
+                <a:ea typeface="Fredoka"/>
+                <a:cs typeface="Fredoka"/>
+                <a:sym typeface="Fredoka"/>
+                <a:hlinkClick r:id="rId3"/>
+              </a:rPr>
+              <a:t>https://api.arcade.academy/en/latest/quick_index.html</a:t>
+            </a:r>
+            <a:endParaRPr sz="2000">
+              <a:solidFill>
+                <a:schemeClr val="dk1"/>
+              </a:solidFill>
+              <a:latin typeface="Fredoka"/>
+              <a:ea typeface="Fredoka"/>
+              <a:cs typeface="Fredoka"/>
+              <a:sym typeface="Fredoka"/>
+            </a:endParaRPr>
+          </a:p>
+          <a:p>
+            <a:pPr indent="0" lvl="0" marL="457200" rtl="0" algn="l">
+              <a:lnSpc>
+                <a:spcPct val="90000"/>
+              </a:lnSpc>
+              <a:spcBef>
+                <a:spcPts val="1000"/>
+              </a:spcBef>
+              <a:spcAft>
+                <a:spcPts val="0"/>
+              </a:spcAft>
+              <a:buNone/>
+            </a:pPr>
+            <a:r>
+              <a:t/>
+            </a:r>
+            <a:endParaRPr sz="2000">
+              <a:solidFill>
+                <a:schemeClr val="dk1"/>
+              </a:solidFill>
+              <a:latin typeface="Fredoka"/>
+              <a:ea typeface="Fredoka"/>
+              <a:cs typeface="Fredoka"/>
+              <a:sym typeface="Fredoka"/>
+            </a:endParaRPr>
+          </a:p>
+          <a:p>
+            <a:pPr indent="0" lvl="0" marL="0" rtl="0" algn="l">
+              <a:lnSpc>
+                <a:spcPct val="90000"/>
+              </a:lnSpc>
+              <a:spcBef>
+                <a:spcPts val="1000"/>
+              </a:spcBef>
+              <a:spcAft>
+                <a:spcPts val="0"/>
+              </a:spcAft>
+              <a:buNone/>
+            </a:pPr>
+            <a:r>
+              <a:t/>
+            </a:r>
+            <a:endParaRPr sz="2000">
+              <a:solidFill>
+                <a:schemeClr val="dk1"/>
+              </a:solidFill>
+              <a:latin typeface="Fredoka"/>
+              <a:ea typeface="Fredoka"/>
+              <a:cs typeface="Fredoka"/>
+              <a:sym typeface="Fredoka"/>
+            </a:endParaRPr>
+          </a:p>
+          <a:p>
+            <a:pPr indent="0" lvl="0" marL="0" rtl="0" algn="ctr">
+              <a:lnSpc>
+                <a:spcPct val="90000"/>
+              </a:lnSpc>
+              <a:spcBef>
+                <a:spcPts val="1000"/>
+              </a:spcBef>
+              <a:spcAft>
+                <a:spcPts val="1000"/>
+              </a:spcAft>
+              <a:buNone/>
+            </a:pPr>
+            <a:r>
+              <a:t/>
+            </a:r>
+            <a:endParaRPr b="1" sz="2000">
+              <a:solidFill>
+                <a:schemeClr val="dk1"/>
+              </a:solidFill>
+              <a:latin typeface="Fredoka"/>
+              <a:ea typeface="Fredoka"/>
+              <a:cs typeface="Fredoka"/>
+              <a:sym typeface="Fredoka"/>
+            </a:endParaRPr>
+          </a:p>
+        </p:txBody>
+      </p:sp>
+    </p:spTree>
+  </p:cSld>
+  <p:clrMapOvr>
+    <a:masterClrMapping/>
+  </p:clrMapOvr>
+</p:sld>
+</file>
+
 <file path=ppt/slides/slide5.xml><?xml version="1.0" encoding="utf-8"?>
 <p:sld xmlns:a="http://schemas.openxmlformats.org/drawingml/2006/main" xmlns:r="http://schemas.openxmlformats.org/officeDocument/2006/relationships" xmlns:mc="http://schemas.openxmlformats.org/markup-compatibility/2006" xmlns:mv="urn:schemas-microsoft-com:mac:vml" xmlns:p="http://schemas.openxmlformats.org/presentationml/2006/main" xmlns:c="http://schemas.openxmlformats.org/drawingml/2006/chart" xmlns:dgm="http://schemas.openxmlformats.org/drawingml/2006/diagram" xmlns:o="urn:schemas-microsoft-com:office:office" xmlns:v="urn:schemas-microsoft-com:vml" xmlns:pvml="urn:schemas-microsoft-com:office:powerpoint" xmlns:com="http://schemas.openxmlformats.org/drawingml/2006/compatibility" xmlns:p14="http://schemas.microsoft.com/office/powerpoint/2010/main" xmlns:p15="http://schemas.microsoft.com/office/powerpoint/2012/main" xmlns:ahyp="http://schemas.microsoft.com/office/drawing/2018/hyperlinkcolor">
   <p:cSld>
@@ -31447,6 +33107,1488 @@
       </p:par>
     </p:tnLst>
   </p:timing>
+</p:sld>
+</file>
+
+<file path=ppt/slides/slide50.xml><?xml version="1.0" encoding="utf-8"?>
+<p:sld xmlns:a="http://schemas.openxmlformats.org/drawingml/2006/main" xmlns:r="http://schemas.openxmlformats.org/officeDocument/2006/relationships" xmlns:mc="http://schemas.openxmlformats.org/markup-compatibility/2006" xmlns:mv="urn:schemas-microsoft-com:mac:vml" xmlns:p="http://schemas.openxmlformats.org/presentationml/2006/main" xmlns:c="http://schemas.openxmlformats.org/drawingml/2006/chart" xmlns:dgm="http://schemas.openxmlformats.org/drawingml/2006/diagram" xmlns:o="urn:schemas-microsoft-com:office:office" xmlns:v="urn:schemas-microsoft-com:vml" xmlns:pvml="urn:schemas-microsoft-com:office:powerpoint" xmlns:com="http://schemas.openxmlformats.org/drawingml/2006/compatibility" xmlns:p14="http://schemas.microsoft.com/office/powerpoint/2010/main" xmlns:p15="http://schemas.microsoft.com/office/powerpoint/2012/main" xmlns:ahyp="http://schemas.microsoft.com/office/drawing/2018/hyperlinkcolor">
+  <p:cSld>
+    <p:spTree>
+      <p:nvGrpSpPr>
+        <p:cNvPr id="431" name="Shape 431"/>
+        <p:cNvGrpSpPr/>
+        <p:nvPr/>
+      </p:nvGrpSpPr>
+      <p:grpSpPr>
+        <a:xfrm>
+          <a:off x="0" y="0"/>
+          <a:ext cx="0" cy="0"/>
+          <a:chOff x="0" y="0"/>
+          <a:chExt cx="0" cy="0"/>
+        </a:xfrm>
+      </p:grpSpPr>
+      <p:sp>
+        <p:nvSpPr>
+          <p:cNvPr id="432" name="Google Shape;432;p57"/>
+          <p:cNvSpPr txBox="1"/>
+          <p:nvPr>
+            <p:ph type="title"/>
+          </p:nvPr>
+        </p:nvSpPr>
+        <p:spPr>
+          <a:xfrm>
+            <a:off x="4925100" y="1911088"/>
+            <a:ext cx="9082200" cy="923400"/>
+          </a:xfrm>
+          <a:prstGeom prst="rect">
+            <a:avLst/>
+          </a:prstGeom>
+          <a:noFill/>
+          <a:ln>
+            <a:noFill/>
+          </a:ln>
+        </p:spPr>
+        <p:txBody>
+          <a:bodyPr anchorCtr="0" anchor="t" bIns="91425" lIns="91425" spcFirstLastPara="1" rIns="91425" wrap="square" tIns="91425">
+            <a:spAutoFit/>
+          </a:bodyPr>
+          <a:lstStyle/>
+          <a:p>
+            <a:pPr indent="0" lvl="0" marL="0" rtl="0" algn="ctr">
+              <a:lnSpc>
+                <a:spcPct val="100000"/>
+              </a:lnSpc>
+              <a:spcBef>
+                <a:spcPts val="0"/>
+              </a:spcBef>
+              <a:spcAft>
+                <a:spcPts val="0"/>
+              </a:spcAft>
+              <a:buSzPts val="6000"/>
+              <a:buNone/>
+            </a:pPr>
+            <a:r>
+              <a:rPr b="1" lang="en-US" sz="4800"/>
+              <a:t>Object Oriented Programming	</a:t>
+            </a:r>
+            <a:endParaRPr b="1" sz="4800">
+              <a:latin typeface="Fredoka"/>
+              <a:ea typeface="Fredoka"/>
+              <a:cs typeface="Fredoka"/>
+              <a:sym typeface="Fredoka"/>
+            </a:endParaRPr>
+          </a:p>
+        </p:txBody>
+      </p:sp>
+      <p:sp>
+        <p:nvSpPr>
+          <p:cNvPr id="433" name="Google Shape;433;p57"/>
+          <p:cNvSpPr txBox="1"/>
+          <p:nvPr/>
+        </p:nvSpPr>
+        <p:spPr>
+          <a:xfrm>
+            <a:off x="16017425" y="600575"/>
+            <a:ext cx="1343700" cy="415500"/>
+          </a:xfrm>
+          <a:prstGeom prst="rect">
+            <a:avLst/>
+          </a:prstGeom>
+          <a:noFill/>
+          <a:ln>
+            <a:noFill/>
+          </a:ln>
+        </p:spPr>
+        <p:txBody>
+          <a:bodyPr anchorCtr="0" anchor="t" bIns="91425" lIns="91425" spcFirstLastPara="1" rIns="91425" wrap="square" tIns="91425">
+            <a:spAutoFit/>
+          </a:bodyPr>
+          <a:lstStyle/>
+          <a:p>
+            <a:pPr indent="0" lvl="0" marL="0" marR="0" rtl="0" algn="ctr">
+              <a:lnSpc>
+                <a:spcPct val="100000"/>
+              </a:lnSpc>
+              <a:spcBef>
+                <a:spcPts val="0"/>
+              </a:spcBef>
+              <a:spcAft>
+                <a:spcPts val="0"/>
+              </a:spcAft>
+              <a:buClr>
+                <a:srgbClr val="000000"/>
+              </a:buClr>
+              <a:buSzPts val="1500"/>
+              <a:buFont typeface="Arial"/>
+              <a:buNone/>
+            </a:pPr>
+            <a:r>
+              <a:t/>
+            </a:r>
+            <a:endParaRPr b="0" i="0" sz="1500" u="none" cap="none" strike="noStrike">
+              <a:solidFill>
+                <a:srgbClr val="4A0D50"/>
+              </a:solidFill>
+              <a:latin typeface="Fredoka"/>
+              <a:ea typeface="Fredoka"/>
+              <a:cs typeface="Fredoka"/>
+              <a:sym typeface="Fredoka"/>
+            </a:endParaRPr>
+          </a:p>
+        </p:txBody>
+      </p:sp>
+      <p:sp>
+        <p:nvSpPr>
+          <p:cNvPr id="434" name="Google Shape;434;p57"/>
+          <p:cNvSpPr txBox="1"/>
+          <p:nvPr>
+            <p:ph idx="12" type="sldNum"/>
+          </p:nvPr>
+        </p:nvSpPr>
+        <p:spPr>
+          <a:xfrm>
+            <a:off x="969275" y="0"/>
+            <a:ext cx="1673100" cy="650700"/>
+          </a:xfrm>
+          <a:prstGeom prst="rect">
+            <a:avLst/>
+          </a:prstGeom>
+          <a:noFill/>
+          <a:ln>
+            <a:noFill/>
+          </a:ln>
+        </p:spPr>
+        <p:txBody>
+          <a:bodyPr anchorCtr="0" anchor="t" bIns="167625" lIns="167625" spcFirstLastPara="1" rIns="167625" wrap="square" tIns="167625">
+            <a:noAutofit/>
+          </a:bodyPr>
+          <a:lstStyle/>
+          <a:p>
+            <a:pPr indent="0" lvl="0" marL="0" rtl="0" algn="l">
+              <a:lnSpc>
+                <a:spcPct val="100000"/>
+              </a:lnSpc>
+              <a:spcBef>
+                <a:spcPts val="0"/>
+              </a:spcBef>
+              <a:spcAft>
+                <a:spcPts val="0"/>
+              </a:spcAft>
+              <a:buSzPts val="1800"/>
+              <a:buNone/>
+            </a:pPr>
+            <a:r>
+              <a:rPr lang="en-US"/>
+              <a:t>Slide </a:t>
+            </a:r>
+            <a:fld id="{00000000-1234-1234-1234-123412341234}" type="slidenum">
+              <a:rPr lang="en-US"/>
+              <a:t>‹#›</a:t>
+            </a:fld>
+            <a:endParaRPr/>
+          </a:p>
+        </p:txBody>
+      </p:sp>
+      <p:sp>
+        <p:nvSpPr>
+          <p:cNvPr id="435" name="Google Shape;435;p57"/>
+          <p:cNvSpPr txBox="1"/>
+          <p:nvPr>
+            <p:ph type="title"/>
+          </p:nvPr>
+        </p:nvSpPr>
+        <p:spPr>
+          <a:xfrm>
+            <a:off x="4602900" y="3428988"/>
+            <a:ext cx="9082200" cy="1293000"/>
+          </a:xfrm>
+          <a:prstGeom prst="rect">
+            <a:avLst/>
+          </a:prstGeom>
+          <a:noFill/>
+          <a:ln>
+            <a:noFill/>
+          </a:ln>
+        </p:spPr>
+        <p:txBody>
+          <a:bodyPr anchorCtr="0" anchor="t" bIns="91425" lIns="91425" spcFirstLastPara="1" rIns="91425" wrap="square" tIns="91425">
+            <a:spAutoFit/>
+          </a:bodyPr>
+          <a:lstStyle/>
+          <a:p>
+            <a:pPr indent="-381000" lvl="0" marL="457200" rtl="0" algn="l">
+              <a:lnSpc>
+                <a:spcPct val="100000"/>
+              </a:lnSpc>
+              <a:spcBef>
+                <a:spcPts val="0"/>
+              </a:spcBef>
+              <a:spcAft>
+                <a:spcPts val="0"/>
+              </a:spcAft>
+              <a:buSzPts val="2400"/>
+              <a:buFont typeface="Arial"/>
+              <a:buChar char="●"/>
+            </a:pPr>
+            <a:r>
+              <a:rPr b="1" lang="en-US" sz="2400"/>
+              <a:t>What is OOP?</a:t>
+            </a:r>
+            <a:endParaRPr b="1" sz="2400"/>
+          </a:p>
+          <a:p>
+            <a:pPr indent="-381000" lvl="0" marL="457200" rtl="0" algn="l">
+              <a:lnSpc>
+                <a:spcPct val="100000"/>
+              </a:lnSpc>
+              <a:spcBef>
+                <a:spcPts val="0"/>
+              </a:spcBef>
+              <a:spcAft>
+                <a:spcPts val="0"/>
+              </a:spcAft>
+              <a:buSzPts val="2400"/>
+              <a:buChar char="●"/>
+            </a:pPr>
+            <a:r>
+              <a:rPr b="1" lang="en-US" sz="2400"/>
+              <a:t>What is a Class</a:t>
+            </a:r>
+            <a:endParaRPr b="1" sz="2400"/>
+          </a:p>
+          <a:p>
+            <a:pPr indent="-381000" lvl="0" marL="457200" rtl="0" algn="l">
+              <a:lnSpc>
+                <a:spcPct val="100000"/>
+              </a:lnSpc>
+              <a:spcBef>
+                <a:spcPts val="0"/>
+              </a:spcBef>
+              <a:spcAft>
+                <a:spcPts val="0"/>
+              </a:spcAft>
+              <a:buSzPts val="2400"/>
+              <a:buChar char="●"/>
+            </a:pPr>
+            <a:r>
+              <a:rPr b="1" lang="en-US" sz="2400"/>
+              <a:t>What is an object?</a:t>
+            </a:r>
+            <a:endParaRPr b="1" sz="2400"/>
+          </a:p>
+        </p:txBody>
+      </p:sp>
+    </p:spTree>
+  </p:cSld>
+  <p:clrMapOvr>
+    <a:masterClrMapping/>
+  </p:clrMapOvr>
+</p:sld>
+</file>
+
+<file path=ppt/slides/slide51.xml><?xml version="1.0" encoding="utf-8"?>
+<p:sld xmlns:a="http://schemas.openxmlformats.org/drawingml/2006/main" xmlns:r="http://schemas.openxmlformats.org/officeDocument/2006/relationships" xmlns:mc="http://schemas.openxmlformats.org/markup-compatibility/2006" xmlns:mv="urn:schemas-microsoft-com:mac:vml" xmlns:p="http://schemas.openxmlformats.org/presentationml/2006/main" xmlns:c="http://schemas.openxmlformats.org/drawingml/2006/chart" xmlns:dgm="http://schemas.openxmlformats.org/drawingml/2006/diagram" xmlns:o="urn:schemas-microsoft-com:office:office" xmlns:v="urn:schemas-microsoft-com:vml" xmlns:pvml="urn:schemas-microsoft-com:office:powerpoint" xmlns:com="http://schemas.openxmlformats.org/drawingml/2006/compatibility" xmlns:p14="http://schemas.microsoft.com/office/powerpoint/2010/main" xmlns:p15="http://schemas.microsoft.com/office/powerpoint/2012/main" xmlns:ahyp="http://schemas.microsoft.com/office/drawing/2018/hyperlinkcolor">
+  <p:cSld>
+    <p:spTree>
+      <p:nvGrpSpPr>
+        <p:cNvPr id="439" name="Shape 439"/>
+        <p:cNvGrpSpPr/>
+        <p:nvPr/>
+      </p:nvGrpSpPr>
+      <p:grpSpPr>
+        <a:xfrm>
+          <a:off x="0" y="0"/>
+          <a:ext cx="0" cy="0"/>
+          <a:chOff x="0" y="0"/>
+          <a:chExt cx="0" cy="0"/>
+        </a:xfrm>
+      </p:grpSpPr>
+      <p:sp>
+        <p:nvSpPr>
+          <p:cNvPr id="440" name="Google Shape;440;p58"/>
+          <p:cNvSpPr txBox="1"/>
+          <p:nvPr>
+            <p:ph type="title"/>
+          </p:nvPr>
+        </p:nvSpPr>
+        <p:spPr>
+          <a:xfrm>
+            <a:off x="4925100" y="1911088"/>
+            <a:ext cx="9082200" cy="923400"/>
+          </a:xfrm>
+          <a:prstGeom prst="rect">
+            <a:avLst/>
+          </a:prstGeom>
+          <a:noFill/>
+          <a:ln>
+            <a:noFill/>
+          </a:ln>
+        </p:spPr>
+        <p:txBody>
+          <a:bodyPr anchorCtr="0" anchor="t" bIns="91425" lIns="91425" spcFirstLastPara="1" rIns="91425" wrap="square" tIns="91425">
+            <a:spAutoFit/>
+          </a:bodyPr>
+          <a:lstStyle/>
+          <a:p>
+            <a:pPr indent="0" lvl="0" marL="0" rtl="0" algn="ctr">
+              <a:lnSpc>
+                <a:spcPct val="100000"/>
+              </a:lnSpc>
+              <a:spcBef>
+                <a:spcPts val="0"/>
+              </a:spcBef>
+              <a:spcAft>
+                <a:spcPts val="0"/>
+              </a:spcAft>
+              <a:buSzPts val="6000"/>
+              <a:buNone/>
+            </a:pPr>
+            <a:r>
+              <a:rPr b="1" lang="en-US" sz="4800"/>
+              <a:t>Object Oriented Programming	</a:t>
+            </a:r>
+            <a:endParaRPr b="1" sz="4800">
+              <a:latin typeface="Fredoka"/>
+              <a:ea typeface="Fredoka"/>
+              <a:cs typeface="Fredoka"/>
+              <a:sym typeface="Fredoka"/>
+            </a:endParaRPr>
+          </a:p>
+        </p:txBody>
+      </p:sp>
+      <p:sp>
+        <p:nvSpPr>
+          <p:cNvPr id="441" name="Google Shape;441;p58"/>
+          <p:cNvSpPr txBox="1"/>
+          <p:nvPr/>
+        </p:nvSpPr>
+        <p:spPr>
+          <a:xfrm>
+            <a:off x="16017425" y="600575"/>
+            <a:ext cx="1343700" cy="415500"/>
+          </a:xfrm>
+          <a:prstGeom prst="rect">
+            <a:avLst/>
+          </a:prstGeom>
+          <a:noFill/>
+          <a:ln>
+            <a:noFill/>
+          </a:ln>
+        </p:spPr>
+        <p:txBody>
+          <a:bodyPr anchorCtr="0" anchor="t" bIns="91425" lIns="91425" spcFirstLastPara="1" rIns="91425" wrap="square" tIns="91425">
+            <a:spAutoFit/>
+          </a:bodyPr>
+          <a:lstStyle/>
+          <a:p>
+            <a:pPr indent="0" lvl="0" marL="0" marR="0" rtl="0" algn="ctr">
+              <a:lnSpc>
+                <a:spcPct val="100000"/>
+              </a:lnSpc>
+              <a:spcBef>
+                <a:spcPts val="0"/>
+              </a:spcBef>
+              <a:spcAft>
+                <a:spcPts val="0"/>
+              </a:spcAft>
+              <a:buClr>
+                <a:srgbClr val="000000"/>
+              </a:buClr>
+              <a:buSzPts val="1500"/>
+              <a:buFont typeface="Arial"/>
+              <a:buNone/>
+            </a:pPr>
+            <a:r>
+              <a:t/>
+            </a:r>
+            <a:endParaRPr b="0" i="0" sz="1500" u="none" cap="none" strike="noStrike">
+              <a:solidFill>
+                <a:srgbClr val="4A0D50"/>
+              </a:solidFill>
+              <a:latin typeface="Fredoka"/>
+              <a:ea typeface="Fredoka"/>
+              <a:cs typeface="Fredoka"/>
+              <a:sym typeface="Fredoka"/>
+            </a:endParaRPr>
+          </a:p>
+        </p:txBody>
+      </p:sp>
+      <p:sp>
+        <p:nvSpPr>
+          <p:cNvPr id="442" name="Google Shape;442;p58"/>
+          <p:cNvSpPr txBox="1"/>
+          <p:nvPr>
+            <p:ph idx="12" type="sldNum"/>
+          </p:nvPr>
+        </p:nvSpPr>
+        <p:spPr>
+          <a:xfrm>
+            <a:off x="969275" y="0"/>
+            <a:ext cx="1673100" cy="650700"/>
+          </a:xfrm>
+          <a:prstGeom prst="rect">
+            <a:avLst/>
+          </a:prstGeom>
+          <a:noFill/>
+          <a:ln>
+            <a:noFill/>
+          </a:ln>
+        </p:spPr>
+        <p:txBody>
+          <a:bodyPr anchorCtr="0" anchor="t" bIns="167625" lIns="167625" spcFirstLastPara="1" rIns="167625" wrap="square" tIns="167625">
+            <a:noAutofit/>
+          </a:bodyPr>
+          <a:lstStyle/>
+          <a:p>
+            <a:pPr indent="0" lvl="0" marL="0" rtl="0" algn="l">
+              <a:lnSpc>
+                <a:spcPct val="100000"/>
+              </a:lnSpc>
+              <a:spcBef>
+                <a:spcPts val="0"/>
+              </a:spcBef>
+              <a:spcAft>
+                <a:spcPts val="0"/>
+              </a:spcAft>
+              <a:buSzPts val="1800"/>
+              <a:buNone/>
+            </a:pPr>
+            <a:r>
+              <a:rPr lang="en-US"/>
+              <a:t>Slide </a:t>
+            </a:r>
+            <a:fld id="{00000000-1234-1234-1234-123412341234}" type="slidenum">
+              <a:rPr lang="en-US"/>
+              <a:t>‹#›</a:t>
+            </a:fld>
+            <a:endParaRPr/>
+          </a:p>
+        </p:txBody>
+      </p:sp>
+      <p:sp>
+        <p:nvSpPr>
+          <p:cNvPr id="443" name="Google Shape;443;p58"/>
+          <p:cNvSpPr txBox="1"/>
+          <p:nvPr>
+            <p:ph type="title"/>
+          </p:nvPr>
+        </p:nvSpPr>
+        <p:spPr>
+          <a:xfrm>
+            <a:off x="4602900" y="3428988"/>
+            <a:ext cx="9082200" cy="4740900"/>
+          </a:xfrm>
+          <a:prstGeom prst="rect">
+            <a:avLst/>
+          </a:prstGeom>
+          <a:noFill/>
+          <a:ln>
+            <a:noFill/>
+          </a:ln>
+        </p:spPr>
+        <p:txBody>
+          <a:bodyPr anchorCtr="0" anchor="t" bIns="91425" lIns="91425" spcFirstLastPara="1" rIns="91425" wrap="square" tIns="91425">
+            <a:spAutoFit/>
+          </a:bodyPr>
+          <a:lstStyle/>
+          <a:p>
+            <a:pPr indent="-381000" lvl="0" marL="457200" rtl="0" algn="l">
+              <a:lnSpc>
+                <a:spcPct val="100000"/>
+              </a:lnSpc>
+              <a:spcBef>
+                <a:spcPts val="0"/>
+              </a:spcBef>
+              <a:spcAft>
+                <a:spcPts val="0"/>
+              </a:spcAft>
+              <a:buSzPts val="2400"/>
+              <a:buChar char="●"/>
+            </a:pPr>
+            <a:r>
+              <a:rPr b="1" lang="en-US" sz="2400"/>
+              <a:t>A class is like a blueprint or design for all the objects created using the class</a:t>
+            </a:r>
+            <a:endParaRPr b="1" sz="2400"/>
+          </a:p>
+          <a:p>
+            <a:pPr indent="-381000" lvl="0" marL="457200" rtl="0" algn="l">
+              <a:lnSpc>
+                <a:spcPct val="100000"/>
+              </a:lnSpc>
+              <a:spcBef>
+                <a:spcPts val="0"/>
+              </a:spcBef>
+              <a:spcAft>
+                <a:spcPts val="0"/>
+              </a:spcAft>
+              <a:buSzPts val="2400"/>
+              <a:buChar char="●"/>
+            </a:pPr>
+            <a:r>
+              <a:rPr b="1" lang="en-US" sz="2400"/>
+              <a:t>Variables inside an object are called attributes or instance variables</a:t>
+            </a:r>
+            <a:endParaRPr b="1" sz="2400"/>
+          </a:p>
+          <a:p>
+            <a:pPr indent="-381000" lvl="0" marL="457200" rtl="0" algn="l">
+              <a:lnSpc>
+                <a:spcPct val="100000"/>
+              </a:lnSpc>
+              <a:spcBef>
+                <a:spcPts val="0"/>
+              </a:spcBef>
+              <a:spcAft>
+                <a:spcPts val="0"/>
+              </a:spcAft>
+              <a:buSzPts val="2400"/>
+              <a:buChar char="●"/>
+            </a:pPr>
+            <a:r>
+              <a:rPr b="1" lang="en-US" sz="2400"/>
+              <a:t>Functions within an object are called methods</a:t>
+            </a:r>
+            <a:endParaRPr b="1" sz="2400"/>
+          </a:p>
+          <a:p>
+            <a:pPr indent="-381000" lvl="0" marL="457200" rtl="0" algn="l">
+              <a:lnSpc>
+                <a:spcPct val="100000"/>
+              </a:lnSpc>
+              <a:spcBef>
+                <a:spcPts val="0"/>
+              </a:spcBef>
+              <a:spcAft>
+                <a:spcPts val="0"/>
+              </a:spcAft>
+              <a:buSzPts val="2400"/>
+              <a:buChar char="●"/>
+            </a:pPr>
+            <a:r>
+              <a:rPr b="1" lang="en-US" sz="2400"/>
+              <a:t>Class names start with a capital letter</a:t>
+            </a:r>
+            <a:endParaRPr b="1" sz="2400"/>
+          </a:p>
+          <a:p>
+            <a:pPr indent="-381000" lvl="0" marL="457200" rtl="0" algn="l">
+              <a:lnSpc>
+                <a:spcPct val="100000"/>
+              </a:lnSpc>
+              <a:spcBef>
+                <a:spcPts val="0"/>
+              </a:spcBef>
+              <a:spcAft>
+                <a:spcPts val="0"/>
+              </a:spcAft>
+              <a:buSzPts val="2400"/>
+              <a:buChar char="●"/>
+            </a:pPr>
+            <a:r>
+              <a:rPr b="1" lang="en-US" sz="2400"/>
+              <a:t>Classes contain a special __init__ function</a:t>
+            </a:r>
+            <a:endParaRPr b="1" sz="2400"/>
+          </a:p>
+          <a:p>
+            <a:pPr indent="-355600" lvl="1" marL="914400" rtl="0" algn="l">
+              <a:lnSpc>
+                <a:spcPct val="100000"/>
+              </a:lnSpc>
+              <a:spcBef>
+                <a:spcPts val="0"/>
+              </a:spcBef>
+              <a:spcAft>
+                <a:spcPts val="0"/>
+              </a:spcAft>
+              <a:buSzPts val="2000"/>
+              <a:buChar char="○"/>
+            </a:pPr>
+            <a:r>
+              <a:rPr b="1" lang="en-US" sz="2000"/>
+              <a:t>it is an example of a “magic” or “dunder” function, and has two underscores before and after the name</a:t>
+            </a:r>
+            <a:endParaRPr b="1" sz="2000"/>
+          </a:p>
+          <a:p>
+            <a:pPr indent="-355600" lvl="1" marL="914400" rtl="0" algn="l">
+              <a:lnSpc>
+                <a:spcPct val="100000"/>
+              </a:lnSpc>
+              <a:spcBef>
+                <a:spcPts val="0"/>
+              </a:spcBef>
+              <a:spcAft>
+                <a:spcPts val="0"/>
+              </a:spcAft>
+              <a:buSzPts val="2000"/>
+              <a:buChar char="○"/>
+            </a:pPr>
+            <a:r>
+              <a:rPr b="1" lang="en-US" sz="2000"/>
+              <a:t>the init function is sometimes called the “</a:t>
+            </a:r>
+            <a:r>
+              <a:rPr b="1" lang="en-US" sz="2000"/>
+              <a:t>constructor</a:t>
+            </a:r>
+            <a:r>
+              <a:rPr b="1" lang="en-US" sz="2000"/>
+              <a:t>” function</a:t>
+            </a:r>
+            <a:endParaRPr b="1" sz="2000"/>
+          </a:p>
+          <a:p>
+            <a:pPr indent="-355600" lvl="1" marL="914400" rtl="0" algn="l">
+              <a:lnSpc>
+                <a:spcPct val="100000"/>
+              </a:lnSpc>
+              <a:spcBef>
+                <a:spcPts val="0"/>
+              </a:spcBef>
+              <a:spcAft>
+                <a:spcPts val="0"/>
+              </a:spcAft>
+              <a:buSzPts val="2000"/>
+              <a:buChar char="○"/>
+            </a:pPr>
+            <a:r>
+              <a:rPr b="1" lang="en-US" sz="2000"/>
+              <a:t>the job of the constructor is to set up the variables</a:t>
+            </a:r>
+            <a:endParaRPr b="1" sz="2000"/>
+          </a:p>
+          <a:p>
+            <a:pPr indent="-381000" lvl="0" marL="457200" rtl="0" algn="l">
+              <a:lnSpc>
+                <a:spcPct val="100000"/>
+              </a:lnSpc>
+              <a:spcBef>
+                <a:spcPts val="0"/>
+              </a:spcBef>
+              <a:spcAft>
+                <a:spcPts val="0"/>
+              </a:spcAft>
+              <a:buSzPts val="2400"/>
+              <a:buChar char="●"/>
+            </a:pPr>
+            <a:r>
+              <a:rPr b="1" lang="en-US" sz="2400"/>
+              <a:t>You can find a full description in Chapters 16 and 17 of the Arcade Academy </a:t>
+            </a:r>
+            <a:endParaRPr b="1" sz="2400"/>
+          </a:p>
+        </p:txBody>
+      </p:sp>
+    </p:spTree>
+  </p:cSld>
+  <p:clrMapOvr>
+    <a:masterClrMapping/>
+  </p:clrMapOvr>
+</p:sld>
+</file>
+
+<file path=ppt/slides/slide52.xml><?xml version="1.0" encoding="utf-8"?>
+<p:sld xmlns:a="http://schemas.openxmlformats.org/drawingml/2006/main" xmlns:r="http://schemas.openxmlformats.org/officeDocument/2006/relationships" xmlns:mc="http://schemas.openxmlformats.org/markup-compatibility/2006" xmlns:mv="urn:schemas-microsoft-com:mac:vml" xmlns:p="http://schemas.openxmlformats.org/presentationml/2006/main" xmlns:c="http://schemas.openxmlformats.org/drawingml/2006/chart" xmlns:dgm="http://schemas.openxmlformats.org/drawingml/2006/diagram" xmlns:o="urn:schemas-microsoft-com:office:office" xmlns:v="urn:schemas-microsoft-com:vml" xmlns:pvml="urn:schemas-microsoft-com:office:powerpoint" xmlns:com="http://schemas.openxmlformats.org/drawingml/2006/compatibility" xmlns:p14="http://schemas.microsoft.com/office/powerpoint/2010/main" xmlns:p15="http://schemas.microsoft.com/office/powerpoint/2012/main" xmlns:ahyp="http://schemas.microsoft.com/office/drawing/2018/hyperlinkcolor">
+  <p:cSld>
+    <p:spTree>
+      <p:nvGrpSpPr>
+        <p:cNvPr id="447" name="Shape 447"/>
+        <p:cNvGrpSpPr/>
+        <p:nvPr/>
+      </p:nvGrpSpPr>
+      <p:grpSpPr>
+        <a:xfrm>
+          <a:off x="0" y="0"/>
+          <a:ext cx="0" cy="0"/>
+          <a:chOff x="0" y="0"/>
+          <a:chExt cx="0" cy="0"/>
+        </a:xfrm>
+      </p:grpSpPr>
+      <p:sp>
+        <p:nvSpPr>
+          <p:cNvPr id="448" name="Google Shape;448;p59"/>
+          <p:cNvSpPr txBox="1"/>
+          <p:nvPr>
+            <p:ph type="title"/>
+          </p:nvPr>
+        </p:nvSpPr>
+        <p:spPr>
+          <a:xfrm>
+            <a:off x="4925100" y="1911088"/>
+            <a:ext cx="9082200" cy="923400"/>
+          </a:xfrm>
+          <a:prstGeom prst="rect">
+            <a:avLst/>
+          </a:prstGeom>
+          <a:noFill/>
+          <a:ln>
+            <a:noFill/>
+          </a:ln>
+        </p:spPr>
+        <p:txBody>
+          <a:bodyPr anchorCtr="0" anchor="t" bIns="91425" lIns="91425" spcFirstLastPara="1" rIns="91425" wrap="square" tIns="91425">
+            <a:spAutoFit/>
+          </a:bodyPr>
+          <a:lstStyle/>
+          <a:p>
+            <a:pPr indent="0" lvl="0" marL="0" rtl="0" algn="ctr">
+              <a:lnSpc>
+                <a:spcPct val="100000"/>
+              </a:lnSpc>
+              <a:spcBef>
+                <a:spcPts val="0"/>
+              </a:spcBef>
+              <a:spcAft>
+                <a:spcPts val="0"/>
+              </a:spcAft>
+              <a:buSzPts val="6000"/>
+              <a:buNone/>
+            </a:pPr>
+            <a:r>
+              <a:rPr b="1" lang="en-US" sz="4800"/>
+              <a:t>Object Oriented Programming	</a:t>
+            </a:r>
+            <a:endParaRPr b="1" sz="4800">
+              <a:latin typeface="Fredoka"/>
+              <a:ea typeface="Fredoka"/>
+              <a:cs typeface="Fredoka"/>
+              <a:sym typeface="Fredoka"/>
+            </a:endParaRPr>
+          </a:p>
+        </p:txBody>
+      </p:sp>
+      <p:sp>
+        <p:nvSpPr>
+          <p:cNvPr id="449" name="Google Shape;449;p59"/>
+          <p:cNvSpPr txBox="1"/>
+          <p:nvPr/>
+        </p:nvSpPr>
+        <p:spPr>
+          <a:xfrm>
+            <a:off x="16017425" y="600575"/>
+            <a:ext cx="1343700" cy="415500"/>
+          </a:xfrm>
+          <a:prstGeom prst="rect">
+            <a:avLst/>
+          </a:prstGeom>
+          <a:noFill/>
+          <a:ln>
+            <a:noFill/>
+          </a:ln>
+        </p:spPr>
+        <p:txBody>
+          <a:bodyPr anchorCtr="0" anchor="t" bIns="91425" lIns="91425" spcFirstLastPara="1" rIns="91425" wrap="square" tIns="91425">
+            <a:spAutoFit/>
+          </a:bodyPr>
+          <a:lstStyle/>
+          <a:p>
+            <a:pPr indent="0" lvl="0" marL="0" marR="0" rtl="0" algn="ctr">
+              <a:lnSpc>
+                <a:spcPct val="100000"/>
+              </a:lnSpc>
+              <a:spcBef>
+                <a:spcPts val="0"/>
+              </a:spcBef>
+              <a:spcAft>
+                <a:spcPts val="0"/>
+              </a:spcAft>
+              <a:buClr>
+                <a:srgbClr val="000000"/>
+              </a:buClr>
+              <a:buSzPts val="1500"/>
+              <a:buFont typeface="Arial"/>
+              <a:buNone/>
+            </a:pPr>
+            <a:r>
+              <a:t/>
+            </a:r>
+            <a:endParaRPr b="0" i="0" sz="1500" u="none" cap="none" strike="noStrike">
+              <a:solidFill>
+                <a:srgbClr val="4A0D50"/>
+              </a:solidFill>
+              <a:latin typeface="Fredoka"/>
+              <a:ea typeface="Fredoka"/>
+              <a:cs typeface="Fredoka"/>
+              <a:sym typeface="Fredoka"/>
+            </a:endParaRPr>
+          </a:p>
+        </p:txBody>
+      </p:sp>
+      <p:sp>
+        <p:nvSpPr>
+          <p:cNvPr id="450" name="Google Shape;450;p59"/>
+          <p:cNvSpPr txBox="1"/>
+          <p:nvPr>
+            <p:ph idx="12" type="sldNum"/>
+          </p:nvPr>
+        </p:nvSpPr>
+        <p:spPr>
+          <a:xfrm>
+            <a:off x="969275" y="0"/>
+            <a:ext cx="1673100" cy="650700"/>
+          </a:xfrm>
+          <a:prstGeom prst="rect">
+            <a:avLst/>
+          </a:prstGeom>
+          <a:noFill/>
+          <a:ln>
+            <a:noFill/>
+          </a:ln>
+        </p:spPr>
+        <p:txBody>
+          <a:bodyPr anchorCtr="0" anchor="t" bIns="167625" lIns="167625" spcFirstLastPara="1" rIns="167625" wrap="square" tIns="167625">
+            <a:noAutofit/>
+          </a:bodyPr>
+          <a:lstStyle/>
+          <a:p>
+            <a:pPr indent="0" lvl="0" marL="0" rtl="0" algn="l">
+              <a:lnSpc>
+                <a:spcPct val="100000"/>
+              </a:lnSpc>
+              <a:spcBef>
+                <a:spcPts val="0"/>
+              </a:spcBef>
+              <a:spcAft>
+                <a:spcPts val="0"/>
+              </a:spcAft>
+              <a:buSzPts val="1800"/>
+              <a:buNone/>
+            </a:pPr>
+            <a:r>
+              <a:rPr lang="en-US"/>
+              <a:t>Slide </a:t>
+            </a:r>
+            <a:fld id="{00000000-1234-1234-1234-123412341234}" type="slidenum">
+              <a:rPr lang="en-US"/>
+              <a:t>‹#›</a:t>
+            </a:fld>
+            <a:endParaRPr/>
+          </a:p>
+        </p:txBody>
+      </p:sp>
+      <p:sp>
+        <p:nvSpPr>
+          <p:cNvPr id="451" name="Google Shape;451;p59"/>
+          <p:cNvSpPr txBox="1"/>
+          <p:nvPr>
+            <p:ph type="title"/>
+          </p:nvPr>
+        </p:nvSpPr>
+        <p:spPr>
+          <a:xfrm>
+            <a:off x="4602900" y="3428988"/>
+            <a:ext cx="9082200" cy="554100"/>
+          </a:xfrm>
+          <a:prstGeom prst="rect">
+            <a:avLst/>
+          </a:prstGeom>
+          <a:noFill/>
+          <a:ln>
+            <a:noFill/>
+          </a:ln>
+        </p:spPr>
+        <p:txBody>
+          <a:bodyPr anchorCtr="0" anchor="t" bIns="91425" lIns="91425" spcFirstLastPara="1" rIns="91425" wrap="square" tIns="91425">
+            <a:spAutoFit/>
+          </a:bodyPr>
+          <a:lstStyle/>
+          <a:p>
+            <a:pPr indent="-381000" lvl="0" marL="457200" rtl="0" algn="l">
+              <a:lnSpc>
+                <a:spcPct val="100000"/>
+              </a:lnSpc>
+              <a:spcBef>
+                <a:spcPts val="0"/>
+              </a:spcBef>
+              <a:spcAft>
+                <a:spcPts val="0"/>
+              </a:spcAft>
+              <a:buSzPts val="2400"/>
+              <a:buFont typeface="Arial"/>
+              <a:buChar char="●"/>
+            </a:pPr>
+            <a:r>
+              <a:rPr b="1" lang="en-US" sz="2400"/>
+              <a:t>Who has done OOP Before?</a:t>
+            </a:r>
+            <a:endParaRPr b="1" sz="2400"/>
+          </a:p>
+        </p:txBody>
+      </p:sp>
+    </p:spTree>
+  </p:cSld>
+  <p:clrMapOvr>
+    <a:masterClrMapping/>
+  </p:clrMapOvr>
+</p:sld>
+</file>
+
+<file path=ppt/slides/slide53.xml><?xml version="1.0" encoding="utf-8"?>
+<p:sld xmlns:a="http://schemas.openxmlformats.org/drawingml/2006/main" xmlns:r="http://schemas.openxmlformats.org/officeDocument/2006/relationships" xmlns:mc="http://schemas.openxmlformats.org/markup-compatibility/2006" xmlns:mv="urn:schemas-microsoft-com:mac:vml" xmlns:p="http://schemas.openxmlformats.org/presentationml/2006/main" xmlns:c="http://schemas.openxmlformats.org/drawingml/2006/chart" xmlns:dgm="http://schemas.openxmlformats.org/drawingml/2006/diagram" xmlns:o="urn:schemas-microsoft-com:office:office" xmlns:v="urn:schemas-microsoft-com:vml" xmlns:pvml="urn:schemas-microsoft-com:office:powerpoint" xmlns:com="http://schemas.openxmlformats.org/drawingml/2006/compatibility" xmlns:p14="http://schemas.microsoft.com/office/powerpoint/2010/main" xmlns:p15="http://schemas.microsoft.com/office/powerpoint/2012/main" xmlns:ahyp="http://schemas.microsoft.com/office/drawing/2018/hyperlinkcolor">
+  <p:cSld>
+    <p:spTree>
+      <p:nvGrpSpPr>
+        <p:cNvPr id="455" name="Shape 455"/>
+        <p:cNvGrpSpPr/>
+        <p:nvPr/>
+      </p:nvGrpSpPr>
+      <p:grpSpPr>
+        <a:xfrm>
+          <a:off x="0" y="0"/>
+          <a:ext cx="0" cy="0"/>
+          <a:chOff x="0" y="0"/>
+          <a:chExt cx="0" cy="0"/>
+        </a:xfrm>
+      </p:grpSpPr>
+      <p:sp>
+        <p:nvSpPr>
+          <p:cNvPr id="456" name="Google Shape;456;p60"/>
+          <p:cNvSpPr txBox="1"/>
+          <p:nvPr/>
+        </p:nvSpPr>
+        <p:spPr>
+          <a:xfrm>
+            <a:off x="13884550" y="123575"/>
+            <a:ext cx="3445200" cy="477000"/>
+          </a:xfrm>
+          <a:prstGeom prst="rect">
+            <a:avLst/>
+          </a:prstGeom>
+          <a:noFill/>
+          <a:ln>
+            <a:noFill/>
+          </a:ln>
+        </p:spPr>
+        <p:txBody>
+          <a:bodyPr anchorCtr="0" anchor="t" bIns="91425" lIns="91425" spcFirstLastPara="1" rIns="91425" wrap="square" tIns="91425">
+            <a:spAutoFit/>
+          </a:bodyPr>
+          <a:lstStyle/>
+          <a:p>
+            <a:pPr indent="0" lvl="0" marL="0" marR="0" rtl="0" algn="r">
+              <a:lnSpc>
+                <a:spcPct val="100000"/>
+              </a:lnSpc>
+              <a:spcBef>
+                <a:spcPts val="0"/>
+              </a:spcBef>
+              <a:spcAft>
+                <a:spcPts val="0"/>
+              </a:spcAft>
+              <a:buClr>
+                <a:srgbClr val="000000"/>
+              </a:buClr>
+              <a:buSzPts val="1900"/>
+              <a:buFont typeface="Arial"/>
+              <a:buNone/>
+            </a:pPr>
+            <a:r>
+              <a:rPr b="0" i="0" lang="en-US" sz="1900" u="none" cap="none" strike="noStrike">
+                <a:solidFill>
+                  <a:schemeClr val="lt1"/>
+                </a:solidFill>
+                <a:latin typeface="Fredoka"/>
+                <a:ea typeface="Fredoka"/>
+                <a:cs typeface="Fredoka"/>
+                <a:sym typeface="Fredoka"/>
+              </a:rPr>
+              <a:t>Estimated time: 15min</a:t>
+            </a:r>
+            <a:endParaRPr b="0" i="0" sz="1900" u="none" cap="none" strike="noStrike">
+              <a:solidFill>
+                <a:schemeClr val="lt1"/>
+              </a:solidFill>
+              <a:latin typeface="Fredoka"/>
+              <a:ea typeface="Fredoka"/>
+              <a:cs typeface="Fredoka"/>
+              <a:sym typeface="Fredoka"/>
+            </a:endParaRPr>
+          </a:p>
+        </p:txBody>
+      </p:sp>
+      <p:sp>
+        <p:nvSpPr>
+          <p:cNvPr id="457" name="Google Shape;457;p60"/>
+          <p:cNvSpPr txBox="1"/>
+          <p:nvPr>
+            <p:ph idx="12" type="sldNum"/>
+          </p:nvPr>
+        </p:nvSpPr>
+        <p:spPr>
+          <a:xfrm>
+            <a:off x="969275" y="0"/>
+            <a:ext cx="1673100" cy="650700"/>
+          </a:xfrm>
+          <a:prstGeom prst="rect">
+            <a:avLst/>
+          </a:prstGeom>
+          <a:noFill/>
+          <a:ln>
+            <a:noFill/>
+          </a:ln>
+        </p:spPr>
+        <p:txBody>
+          <a:bodyPr anchorCtr="0" anchor="t" bIns="167625" lIns="167625" spcFirstLastPara="1" rIns="167625" wrap="square" tIns="167625">
+            <a:noAutofit/>
+          </a:bodyPr>
+          <a:lstStyle/>
+          <a:p>
+            <a:pPr indent="0" lvl="0" marL="0" rtl="0" algn="l">
+              <a:lnSpc>
+                <a:spcPct val="100000"/>
+              </a:lnSpc>
+              <a:spcBef>
+                <a:spcPts val="0"/>
+              </a:spcBef>
+              <a:spcAft>
+                <a:spcPts val="0"/>
+              </a:spcAft>
+              <a:buSzPts val="1800"/>
+              <a:buNone/>
+            </a:pPr>
+            <a:r>
+              <a:rPr lang="en-US"/>
+              <a:t>Slide </a:t>
+            </a:r>
+            <a:fld id="{00000000-1234-1234-1234-123412341234}" type="slidenum">
+              <a:rPr lang="en-US"/>
+              <a:t>‹#›</a:t>
+            </a:fld>
+            <a:endParaRPr/>
+          </a:p>
+        </p:txBody>
+      </p:sp>
+      <p:pic>
+        <p:nvPicPr>
+          <p:cNvPr id="458" name="Google Shape;458;p60" title="15 Minute Timer - Relaxing Zen Music"/>
+          <p:cNvPicPr preferRelativeResize="0"/>
+          <p:nvPr/>
+        </p:nvPicPr>
+        <p:blipFill rotWithShape="1">
+          <a:blip r:embed="rId3">
+            <a:alphaModFix/>
+          </a:blip>
+          <a:srcRect b="0" l="0" r="0" t="0"/>
+          <a:stretch/>
+        </p:blipFill>
+        <p:spPr>
+          <a:xfrm>
+            <a:off x="6136502" y="4166458"/>
+            <a:ext cx="6014995" cy="3398472"/>
+          </a:xfrm>
+          <a:prstGeom prst="rect">
+            <a:avLst/>
+          </a:prstGeom>
+          <a:noFill/>
+          <a:ln>
+            <a:noFill/>
+          </a:ln>
+        </p:spPr>
+      </p:pic>
+    </p:spTree>
+  </p:cSld>
+  <p:clrMapOvr>
+    <a:masterClrMapping/>
+  </p:clrMapOvr>
+  <p:timing>
+    <p:tnLst>
+      <p:par>
+        <p:cTn dur="indefinite" nodeType="tmRoot" restart="never">
+          <p:childTnLst>
+            <p:seq concurrent="1" nextAc="seek">
+              <p:cTn dur="indefinite" id="2" nodeType="mainSeq">
+                <p:childTnLst>
+                  <p:par>
+                    <p:cTn fill="hold">
+                      <p:stCondLst>
+                        <p:cond delay="indefinite"/>
+                      </p:stCondLst>
+                      <p:childTnLst>
+                        <p:par>
+                          <p:cTn fill="hold">
+                            <p:stCondLst>
+                              <p:cond delay="0"/>
+                            </p:stCondLst>
+                            <p:childTnLst>
+                              <p:par>
+                                <p:cTn fill="hold" nodeType="clickEffect" presetClass="entr" presetID="10" presetSubtype="0">
+                                  <p:stCondLst>
+                                    <p:cond delay="0"/>
+                                  </p:stCondLst>
+                                  <p:childTnLst>
+                                    <p:set>
+                                      <p:cBhvr>
+                                        <p:cTn dur="1" fill="hold">
+                                          <p:stCondLst>
+                                            <p:cond delay="0"/>
+                                          </p:stCondLst>
+                                        </p:cTn>
+                                        <p:tgtEl>
+                                          <p:spTgt spid="458"/>
+                                        </p:tgtEl>
+                                        <p:attrNameLst>
+                                          <p:attrName>style.visibility</p:attrName>
+                                        </p:attrNameLst>
+                                      </p:cBhvr>
+                                      <p:to>
+                                        <p:strVal val="visible"/>
+                                      </p:to>
+                                    </p:set>
+                                    <p:animEffect filter="fade" transition="in">
+                                      <p:cBhvr>
+                                        <p:cTn dur="1"/>
+                                        <p:tgtEl>
+                                          <p:spTgt spid="458"/>
+                                        </p:tgtEl>
+                                      </p:cBhvr>
+                                    </p:animEffect>
+                                  </p:childTnLst>
+                                </p:cTn>
+                              </p:par>
+                            </p:childTnLst>
+                          </p:cTn>
+                        </p:par>
+                      </p:childTnLst>
+                    </p:cTn>
+                  </p:par>
+                </p:childTnLst>
+              </p:cTn>
+              <p:prevCondLst>
+                <p:cond evt="onPrev">
+                  <p:tgtEl>
+                    <p:sldTgt/>
+                  </p:tgtEl>
+                </p:cond>
+              </p:prevCondLst>
+              <p:nextCondLst>
+                <p:cond evt="onNext">
+                  <p:tgtEl>
+                    <p:sldTgt/>
+                  </p:tgtEl>
+                </p:cond>
+              </p:nextCondLst>
+            </p:seq>
+          </p:childTnLst>
+        </p:cTn>
+      </p:par>
+    </p:tnLst>
+  </p:timing>
+</p:sld>
+</file>
+
+<file path=ppt/slides/slide54.xml><?xml version="1.0" encoding="utf-8"?>
+<p:sld xmlns:a="http://schemas.openxmlformats.org/drawingml/2006/main" xmlns:r="http://schemas.openxmlformats.org/officeDocument/2006/relationships" xmlns:mc="http://schemas.openxmlformats.org/markup-compatibility/2006" xmlns:mv="urn:schemas-microsoft-com:mac:vml" xmlns:p="http://schemas.openxmlformats.org/presentationml/2006/main" xmlns:c="http://schemas.openxmlformats.org/drawingml/2006/chart" xmlns:dgm="http://schemas.openxmlformats.org/drawingml/2006/diagram" xmlns:o="urn:schemas-microsoft-com:office:office" xmlns:v="urn:schemas-microsoft-com:vml" xmlns:pvml="urn:schemas-microsoft-com:office:powerpoint" xmlns:com="http://schemas.openxmlformats.org/drawingml/2006/compatibility" xmlns:p14="http://schemas.microsoft.com/office/powerpoint/2010/main" xmlns:p15="http://schemas.microsoft.com/office/powerpoint/2012/main" xmlns:ahyp="http://schemas.microsoft.com/office/drawing/2018/hyperlinkcolor">
+  <p:cSld>
+    <p:spTree>
+      <p:nvGrpSpPr>
+        <p:cNvPr id="462" name="Shape 462"/>
+        <p:cNvGrpSpPr/>
+        <p:nvPr/>
+      </p:nvGrpSpPr>
+      <p:grpSpPr>
+        <a:xfrm>
+          <a:off x="0" y="0"/>
+          <a:ext cx="0" cy="0"/>
+          <a:chOff x="0" y="0"/>
+          <a:chExt cx="0" cy="0"/>
+        </a:xfrm>
+      </p:grpSpPr>
+      <p:sp>
+        <p:nvSpPr>
+          <p:cNvPr id="463" name="Google Shape;463;p61"/>
+          <p:cNvSpPr txBox="1"/>
+          <p:nvPr>
+            <p:ph type="title"/>
+          </p:nvPr>
+        </p:nvSpPr>
+        <p:spPr>
+          <a:xfrm>
+            <a:off x="4925100" y="1911088"/>
+            <a:ext cx="9082200" cy="923400"/>
+          </a:xfrm>
+          <a:prstGeom prst="rect">
+            <a:avLst/>
+          </a:prstGeom>
+          <a:noFill/>
+          <a:ln>
+            <a:noFill/>
+          </a:ln>
+        </p:spPr>
+        <p:txBody>
+          <a:bodyPr anchorCtr="0" anchor="t" bIns="91425" lIns="91425" spcFirstLastPara="1" rIns="91425" wrap="square" tIns="91425">
+            <a:spAutoFit/>
+          </a:bodyPr>
+          <a:lstStyle/>
+          <a:p>
+            <a:pPr indent="0" lvl="0" marL="0" rtl="0" algn="ctr">
+              <a:lnSpc>
+                <a:spcPct val="100000"/>
+              </a:lnSpc>
+              <a:spcBef>
+                <a:spcPts val="0"/>
+              </a:spcBef>
+              <a:spcAft>
+                <a:spcPts val="0"/>
+              </a:spcAft>
+              <a:buSzPts val="6000"/>
+              <a:buNone/>
+            </a:pPr>
+            <a:r>
+              <a:rPr b="1" lang="en-US" sz="4800"/>
+              <a:t>Text Based Adventure Game</a:t>
+            </a:r>
+            <a:endParaRPr b="1" sz="4800">
+              <a:latin typeface="Fredoka"/>
+              <a:ea typeface="Fredoka"/>
+              <a:cs typeface="Fredoka"/>
+              <a:sym typeface="Fredoka"/>
+            </a:endParaRPr>
+          </a:p>
+        </p:txBody>
+      </p:sp>
+      <p:sp>
+        <p:nvSpPr>
+          <p:cNvPr id="464" name="Google Shape;464;p61"/>
+          <p:cNvSpPr txBox="1"/>
+          <p:nvPr/>
+        </p:nvSpPr>
+        <p:spPr>
+          <a:xfrm>
+            <a:off x="16017425" y="600575"/>
+            <a:ext cx="1343700" cy="415500"/>
+          </a:xfrm>
+          <a:prstGeom prst="rect">
+            <a:avLst/>
+          </a:prstGeom>
+          <a:noFill/>
+          <a:ln>
+            <a:noFill/>
+          </a:ln>
+        </p:spPr>
+        <p:txBody>
+          <a:bodyPr anchorCtr="0" anchor="t" bIns="91425" lIns="91425" spcFirstLastPara="1" rIns="91425" wrap="square" tIns="91425">
+            <a:spAutoFit/>
+          </a:bodyPr>
+          <a:lstStyle/>
+          <a:p>
+            <a:pPr indent="0" lvl="0" marL="0" marR="0" rtl="0" algn="ctr">
+              <a:lnSpc>
+                <a:spcPct val="100000"/>
+              </a:lnSpc>
+              <a:spcBef>
+                <a:spcPts val="0"/>
+              </a:spcBef>
+              <a:spcAft>
+                <a:spcPts val="0"/>
+              </a:spcAft>
+              <a:buClr>
+                <a:srgbClr val="000000"/>
+              </a:buClr>
+              <a:buSzPts val="1500"/>
+              <a:buFont typeface="Arial"/>
+              <a:buNone/>
+            </a:pPr>
+            <a:r>
+              <a:t/>
+            </a:r>
+            <a:endParaRPr b="0" i="0" sz="1500" u="none" cap="none" strike="noStrike">
+              <a:solidFill>
+                <a:srgbClr val="4A0D50"/>
+              </a:solidFill>
+              <a:latin typeface="Fredoka"/>
+              <a:ea typeface="Fredoka"/>
+              <a:cs typeface="Fredoka"/>
+              <a:sym typeface="Fredoka"/>
+            </a:endParaRPr>
+          </a:p>
+        </p:txBody>
+      </p:sp>
+      <p:sp>
+        <p:nvSpPr>
+          <p:cNvPr id="465" name="Google Shape;465;p61"/>
+          <p:cNvSpPr txBox="1"/>
+          <p:nvPr>
+            <p:ph idx="12" type="sldNum"/>
+          </p:nvPr>
+        </p:nvSpPr>
+        <p:spPr>
+          <a:xfrm>
+            <a:off x="969275" y="0"/>
+            <a:ext cx="1673100" cy="650700"/>
+          </a:xfrm>
+          <a:prstGeom prst="rect">
+            <a:avLst/>
+          </a:prstGeom>
+          <a:noFill/>
+          <a:ln>
+            <a:noFill/>
+          </a:ln>
+        </p:spPr>
+        <p:txBody>
+          <a:bodyPr anchorCtr="0" anchor="t" bIns="167625" lIns="167625" spcFirstLastPara="1" rIns="167625" wrap="square" tIns="167625">
+            <a:noAutofit/>
+          </a:bodyPr>
+          <a:lstStyle/>
+          <a:p>
+            <a:pPr indent="0" lvl="0" marL="0" rtl="0" algn="l">
+              <a:lnSpc>
+                <a:spcPct val="100000"/>
+              </a:lnSpc>
+              <a:spcBef>
+                <a:spcPts val="0"/>
+              </a:spcBef>
+              <a:spcAft>
+                <a:spcPts val="0"/>
+              </a:spcAft>
+              <a:buSzPts val="1800"/>
+              <a:buNone/>
+            </a:pPr>
+            <a:r>
+              <a:rPr lang="en-US"/>
+              <a:t>Slide </a:t>
+            </a:r>
+            <a:fld id="{00000000-1234-1234-1234-123412341234}" type="slidenum">
+              <a:rPr lang="en-US"/>
+              <a:t>‹#›</a:t>
+            </a:fld>
+            <a:endParaRPr/>
+          </a:p>
+        </p:txBody>
+      </p:sp>
+      <p:sp>
+        <p:nvSpPr>
+          <p:cNvPr id="466" name="Google Shape;466;p61"/>
+          <p:cNvSpPr txBox="1"/>
+          <p:nvPr>
+            <p:ph type="title"/>
+          </p:nvPr>
+        </p:nvSpPr>
+        <p:spPr>
+          <a:xfrm>
+            <a:off x="4602900" y="3429000"/>
+            <a:ext cx="10004100" cy="2678100"/>
+          </a:xfrm>
+          <a:prstGeom prst="rect">
+            <a:avLst/>
+          </a:prstGeom>
+          <a:noFill/>
+          <a:ln>
+            <a:noFill/>
+          </a:ln>
+        </p:spPr>
+        <p:txBody>
+          <a:bodyPr anchorCtr="0" anchor="t" bIns="91425" lIns="91425" spcFirstLastPara="1" rIns="91425" wrap="square" tIns="91425">
+            <a:spAutoFit/>
+          </a:bodyPr>
+          <a:lstStyle/>
+          <a:p>
+            <a:pPr indent="-381000" lvl="0" marL="457200" rtl="0" algn="l">
+              <a:lnSpc>
+                <a:spcPct val="100000"/>
+              </a:lnSpc>
+              <a:spcBef>
+                <a:spcPts val="0"/>
+              </a:spcBef>
+              <a:spcAft>
+                <a:spcPts val="0"/>
+              </a:spcAft>
+              <a:buSzPts val="2400"/>
+              <a:buFont typeface="Arial"/>
+              <a:buChar char="●"/>
+            </a:pPr>
+            <a:r>
+              <a:rPr b="1" lang="en-US" sz="2400"/>
+              <a:t>We will use classes and objects to build a multi-room house/castle/dungeon</a:t>
+            </a:r>
+            <a:endParaRPr b="1" sz="2400"/>
+          </a:p>
+          <a:p>
+            <a:pPr indent="-381000" lvl="0" marL="457200" rtl="0" algn="l">
+              <a:lnSpc>
+                <a:spcPct val="100000"/>
+              </a:lnSpc>
+              <a:spcBef>
+                <a:spcPts val="0"/>
+              </a:spcBef>
+              <a:spcAft>
+                <a:spcPts val="0"/>
+              </a:spcAft>
+              <a:buSzPts val="2400"/>
+              <a:buChar char="●"/>
+            </a:pPr>
+            <a:r>
+              <a:rPr b="1" lang="en-US" sz="2400"/>
+              <a:t>On the Arcade Academy website you can find the full instructions for this on the Lab 6 page:</a:t>
+            </a:r>
+            <a:endParaRPr b="1" sz="2400"/>
+          </a:p>
+          <a:p>
+            <a:pPr indent="-342900" lvl="1" marL="914400" rtl="0" algn="l">
+              <a:lnSpc>
+                <a:spcPct val="100000"/>
+              </a:lnSpc>
+              <a:spcBef>
+                <a:spcPts val="0"/>
+              </a:spcBef>
+              <a:spcAft>
+                <a:spcPts val="0"/>
+              </a:spcAft>
+              <a:buSzPts val="1800"/>
+              <a:buChar char="○"/>
+            </a:pPr>
+            <a:r>
+              <a:rPr b="1" lang="en-US" sz="1800"/>
+              <a:t>https://learn.arcade.academy/en/latest/labs/lab_06_text_adventure/adventure.html</a:t>
+            </a:r>
+            <a:endParaRPr b="1" sz="1800"/>
+          </a:p>
+          <a:p>
+            <a:pPr indent="0" lvl="0" marL="0" rtl="0" algn="l">
+              <a:lnSpc>
+                <a:spcPct val="100000"/>
+              </a:lnSpc>
+              <a:spcBef>
+                <a:spcPts val="0"/>
+              </a:spcBef>
+              <a:spcAft>
+                <a:spcPts val="0"/>
+              </a:spcAft>
+              <a:buNone/>
+            </a:pPr>
+            <a:r>
+              <a:t/>
+            </a:r>
+            <a:endParaRPr b="1" sz="2400"/>
+          </a:p>
+          <a:p>
+            <a:pPr indent="-381000" lvl="0" marL="457200" rtl="0" algn="l">
+              <a:lnSpc>
+                <a:spcPct val="100000"/>
+              </a:lnSpc>
+              <a:spcBef>
+                <a:spcPts val="0"/>
+              </a:spcBef>
+              <a:spcAft>
+                <a:spcPts val="0"/>
+              </a:spcAft>
+              <a:buSzPts val="2400"/>
+              <a:buChar char="●"/>
+            </a:pPr>
+            <a:r>
+              <a:rPr b="1" lang="en-US" sz="2400"/>
+              <a:t>First draw a plan of your house/dungeon!</a:t>
+            </a:r>
+            <a:endParaRPr b="1" sz="2400"/>
+          </a:p>
+        </p:txBody>
+      </p:sp>
+    </p:spTree>
+  </p:cSld>
+  <p:clrMapOvr>
+    <a:masterClrMapping/>
+  </p:clrMapOvr>
 </p:sld>
 </file>
 

</xml_diff>

<commit_message>
Update Python OOP Course Presentation.pptx
</commit_message>
<xml_diff>
--- a/Python OOP Course Presentation.pptx
+++ b/Python OOP Course Presentation.pptx
@@ -5,7 +5,7 @@
     <p:sldMasterId id="2147483654" r:id="rId1"/>
   </p:sldMasterIdLst>
   <p:notesMasterIdLst>
-    <p:notesMasterId r:id="rId79"/>
+    <p:notesMasterId r:id="rId81"/>
   </p:notesMasterIdLst>
   <p:sldIdLst>
     <p:sldId id="256" r:id="rId2"/>
@@ -85,14 +85,16 @@
     <p:sldId id="330" r:id="rId76"/>
     <p:sldId id="331" r:id="rId77"/>
     <p:sldId id="332" r:id="rId78"/>
+    <p:sldId id="333" r:id="rId79"/>
+    <p:sldId id="334" r:id="rId80"/>
   </p:sldIdLst>
   <p:sldSz cx="18288000" cy="10287000"/>
   <p:notesSz cx="6858000" cy="9144000"/>
   <p:embeddedFontLst>
     <p:embeddedFont>
       <p:font typeface="Fredoka" panose="020B0604020202020204" charset="-79"/>
-      <p:regular r:id="rId80"/>
-      <p:bold r:id="rId81"/>
+      <p:regular r:id="rId82"/>
+      <p:bold r:id="rId83"/>
     </p:embeddedFont>
   </p:embeddedFontLst>
   <p:defaultTextStyle>
@@ -9778,6 +9780,254 @@
       <p:sp>
         <p:nvSpPr>
           <p:cNvPr id="637" name="Google Shape;637;g2e55749d3f6_0_0:notes"/>
+          <p:cNvSpPr txBox="1">
+            <a:spLocks noGrp="1"/>
+          </p:cNvSpPr>
+          <p:nvPr>
+            <p:ph type="body" idx="1"/>
+          </p:nvPr>
+        </p:nvSpPr>
+        <p:spPr>
+          <a:xfrm>
+            <a:off x="685800" y="4343400"/>
+            <a:ext cx="5486400" cy="4114800"/>
+          </a:xfrm>
+          <a:prstGeom prst="rect">
+            <a:avLst/>
+          </a:prstGeom>
+          <a:noFill/>
+          <a:ln>
+            <a:noFill/>
+          </a:ln>
+        </p:spPr>
+        <p:txBody>
+          <a:bodyPr spcFirstLastPara="1" wrap="square" lIns="91425" tIns="91425" rIns="91425" bIns="91425" anchor="t" anchorCtr="0">
+            <a:noAutofit/>
+          </a:bodyPr>
+          <a:lstStyle/>
+          <a:p>
+            <a:pPr marL="0" lvl="0" indent="0" algn="l" rtl="0">
+              <a:lnSpc>
+                <a:spcPct val="100000"/>
+              </a:lnSpc>
+              <a:spcBef>
+                <a:spcPts val="0"/>
+              </a:spcBef>
+              <a:spcAft>
+                <a:spcPts val="0"/>
+              </a:spcAft>
+              <a:buSzPts val="1100"/>
+              <a:buNone/>
+            </a:pPr>
+            <a:endParaRPr/>
+          </a:p>
+        </p:txBody>
+      </p:sp>
+    </p:spTree>
+  </p:cSld>
+  <p:clrMapOvr>
+    <a:masterClrMapping/>
+  </p:clrMapOvr>
+</p:notes>
+</file>
+
+<file path=ppt/notesSlides/notesSlide78.xml><?xml version="1.0" encoding="utf-8"?>
+<p:notes xmlns:a="http://schemas.openxmlformats.org/drawingml/2006/main" xmlns:r="http://schemas.openxmlformats.org/officeDocument/2006/relationships" xmlns:p="http://schemas.openxmlformats.org/presentationml/2006/main" showMasterSp="0" showMasterPhAnim="0">
+  <p:cSld>
+    <p:spTree>
+      <p:nvGrpSpPr>
+        <p:cNvPr id="1" name="Shape 643"/>
+        <p:cNvGrpSpPr/>
+        <p:nvPr/>
+      </p:nvGrpSpPr>
+      <p:grpSpPr>
+        <a:xfrm>
+          <a:off x="0" y="0"/>
+          <a:ext cx="0" cy="0"/>
+          <a:chOff x="0" y="0"/>
+          <a:chExt cx="0" cy="0"/>
+        </a:xfrm>
+      </p:grpSpPr>
+      <p:sp>
+        <p:nvSpPr>
+          <p:cNvPr id="644" name="Google Shape;644;g2e6066752e5_0_0:notes"/>
+          <p:cNvSpPr>
+            <a:spLocks noGrp="1" noRot="1" noChangeAspect="1"/>
+          </p:cNvSpPr>
+          <p:nvPr>
+            <p:ph type="sldImg" idx="2"/>
+          </p:nvPr>
+        </p:nvSpPr>
+        <p:spPr>
+          <a:xfrm>
+            <a:off x="381000" y="685800"/>
+            <a:ext cx="6096000" cy="3429000"/>
+          </a:xfrm>
+          <a:custGeom>
+            <a:avLst/>
+            <a:gdLst/>
+            <a:ahLst/>
+            <a:cxnLst/>
+            <a:rect l="l" t="t" r="r" b="b"/>
+            <a:pathLst>
+              <a:path w="120000" h="120000" extrusionOk="0">
+                <a:moveTo>
+                  <a:pt x="0" y="0"/>
+                </a:moveTo>
+                <a:lnTo>
+                  <a:pt x="120000" y="0"/>
+                </a:lnTo>
+                <a:lnTo>
+                  <a:pt x="120000" y="120000"/>
+                </a:lnTo>
+                <a:lnTo>
+                  <a:pt x="0" y="120000"/>
+                </a:lnTo>
+                <a:close/>
+              </a:path>
+            </a:pathLst>
+          </a:custGeom>
+          <a:noFill/>
+          <a:ln w="9525" cap="flat" cmpd="sng">
+            <a:solidFill>
+              <a:srgbClr val="000000"/>
+            </a:solidFill>
+            <a:prstDash val="solid"/>
+            <a:round/>
+            <a:headEnd type="none" w="sm" len="sm"/>
+            <a:tailEnd type="none" w="sm" len="sm"/>
+          </a:ln>
+        </p:spPr>
+      </p:sp>
+      <p:sp>
+        <p:nvSpPr>
+          <p:cNvPr id="645" name="Google Shape;645;g2e6066752e5_0_0:notes"/>
+          <p:cNvSpPr txBox="1">
+            <a:spLocks noGrp="1"/>
+          </p:cNvSpPr>
+          <p:nvPr>
+            <p:ph type="body" idx="1"/>
+          </p:nvPr>
+        </p:nvSpPr>
+        <p:spPr>
+          <a:xfrm>
+            <a:off x="685800" y="4343400"/>
+            <a:ext cx="5486400" cy="4114800"/>
+          </a:xfrm>
+          <a:prstGeom prst="rect">
+            <a:avLst/>
+          </a:prstGeom>
+          <a:noFill/>
+          <a:ln>
+            <a:noFill/>
+          </a:ln>
+        </p:spPr>
+        <p:txBody>
+          <a:bodyPr spcFirstLastPara="1" wrap="square" lIns="91425" tIns="91425" rIns="91425" bIns="91425" anchor="t" anchorCtr="0">
+            <a:noAutofit/>
+          </a:bodyPr>
+          <a:lstStyle/>
+          <a:p>
+            <a:pPr marL="0" lvl="0" indent="0" algn="l" rtl="0">
+              <a:lnSpc>
+                <a:spcPct val="100000"/>
+              </a:lnSpc>
+              <a:spcBef>
+                <a:spcPts val="0"/>
+              </a:spcBef>
+              <a:spcAft>
+                <a:spcPts val="0"/>
+              </a:spcAft>
+              <a:buSzPts val="1100"/>
+              <a:buNone/>
+            </a:pPr>
+            <a:r>
+              <a:rPr lang="en-US"/>
+              <a:t>additional keywords here: strings, sequences, syntax</a:t>
+            </a:r>
+            <a:endParaRPr/>
+          </a:p>
+        </p:txBody>
+      </p:sp>
+    </p:spTree>
+  </p:cSld>
+  <p:clrMapOvr>
+    <a:masterClrMapping/>
+  </p:clrMapOvr>
+</p:notes>
+</file>
+
+<file path=ppt/notesSlides/notesSlide79.xml><?xml version="1.0" encoding="utf-8"?>
+<p:notes xmlns:a="http://schemas.openxmlformats.org/drawingml/2006/main" xmlns:r="http://schemas.openxmlformats.org/officeDocument/2006/relationships" xmlns:p="http://schemas.openxmlformats.org/presentationml/2006/main" showMasterSp="0" showMasterPhAnim="0">
+  <p:cSld>
+    <p:spTree>
+      <p:nvGrpSpPr>
+        <p:cNvPr id="1" name="Shape 649"/>
+        <p:cNvGrpSpPr/>
+        <p:nvPr/>
+      </p:nvGrpSpPr>
+      <p:grpSpPr>
+        <a:xfrm>
+          <a:off x="0" y="0"/>
+          <a:ext cx="0" cy="0"/>
+          <a:chOff x="0" y="0"/>
+          <a:chExt cx="0" cy="0"/>
+        </a:xfrm>
+      </p:grpSpPr>
+      <p:sp>
+        <p:nvSpPr>
+          <p:cNvPr id="650" name="Google Shape;650;g2e6066752e5_0_5:notes"/>
+          <p:cNvSpPr>
+            <a:spLocks noGrp="1" noRot="1" noChangeAspect="1"/>
+          </p:cNvSpPr>
+          <p:nvPr>
+            <p:ph type="sldImg" idx="2"/>
+          </p:nvPr>
+        </p:nvSpPr>
+        <p:spPr>
+          <a:xfrm>
+            <a:off x="381000" y="685800"/>
+            <a:ext cx="6096000" cy="3429000"/>
+          </a:xfrm>
+          <a:custGeom>
+            <a:avLst/>
+            <a:gdLst/>
+            <a:ahLst/>
+            <a:cxnLst/>
+            <a:rect l="l" t="t" r="r" b="b"/>
+            <a:pathLst>
+              <a:path w="120000" h="120000" extrusionOk="0">
+                <a:moveTo>
+                  <a:pt x="0" y="0"/>
+                </a:moveTo>
+                <a:lnTo>
+                  <a:pt x="120000" y="0"/>
+                </a:lnTo>
+                <a:lnTo>
+                  <a:pt x="120000" y="120000"/>
+                </a:lnTo>
+                <a:lnTo>
+                  <a:pt x="0" y="120000"/>
+                </a:lnTo>
+                <a:close/>
+              </a:path>
+            </a:pathLst>
+          </a:custGeom>
+          <a:noFill/>
+          <a:ln w="9525" cap="flat" cmpd="sng">
+            <a:solidFill>
+              <a:srgbClr val="000000"/>
+            </a:solidFill>
+            <a:prstDash val="solid"/>
+            <a:round/>
+            <a:headEnd type="none" w="sm" len="sm"/>
+            <a:tailEnd type="none" w="sm" len="sm"/>
+          </a:ln>
+        </p:spPr>
+      </p:sp>
+      <p:sp>
+        <p:nvSpPr>
+          <p:cNvPr id="651" name="Google Shape;651;g2e6066752e5_0_5:notes"/>
           <p:cNvSpPr txBox="1">
             <a:spLocks noGrp="1"/>
           </p:cNvSpPr>
@@ -51433,7 +51683,7 @@
             <a:tbl>
               <a:tblPr>
                 <a:noFill/>
-                <a:tableStyleId>{3F881D79-0CCF-45F7-9216-A95B5B79B7BA}</a:tableStyleId>
+                <a:tableStyleId>{DEA5C46B-B0B9-4B3B-A468-27E9B1E1AD04}</a:tableStyleId>
               </a:tblPr>
               <a:tblGrid>
                 <a:gridCol w="2181675">
@@ -52442,7 +52692,7 @@
             <a:tbl>
               <a:tblPr>
                 <a:noFill/>
-                <a:tableStyleId>{3F881D79-0CCF-45F7-9216-A95B5B79B7BA}</a:tableStyleId>
+                <a:tableStyleId>{DEA5C46B-B0B9-4B3B-A468-27E9B1E1AD04}</a:tableStyleId>
               </a:tblPr>
               <a:tblGrid>
                 <a:gridCol w="2181675">
@@ -53032,6 +53282,606 @@
   <p:clrMapOvr>
     <a:masterClrMapping/>
   </p:clrMapOvr>
+</p:sld>
+</file>
+
+<file path=ppt/slides/slide78.xml><?xml version="1.0" encoding="utf-8"?>
+<p:sld xmlns:a="http://schemas.openxmlformats.org/drawingml/2006/main" xmlns:r="http://schemas.openxmlformats.org/officeDocument/2006/relationships" xmlns:p="http://schemas.openxmlformats.org/presentationml/2006/main">
+  <p:cSld>
+    <p:spTree>
+      <p:nvGrpSpPr>
+        <p:cNvPr id="1" name="Shape 646"/>
+        <p:cNvGrpSpPr/>
+        <p:nvPr/>
+      </p:nvGrpSpPr>
+      <p:grpSpPr>
+        <a:xfrm>
+          <a:off x="0" y="0"/>
+          <a:ext cx="0" cy="0"/>
+          <a:chOff x="0" y="0"/>
+          <a:chExt cx="0" cy="0"/>
+        </a:xfrm>
+      </p:grpSpPr>
+      <p:sp>
+        <p:nvSpPr>
+          <p:cNvPr id="647" name="Google Shape;647;p85"/>
+          <p:cNvSpPr txBox="1">
+            <a:spLocks noGrp="1"/>
+          </p:cNvSpPr>
+          <p:nvPr>
+            <p:ph type="sldNum" idx="12"/>
+          </p:nvPr>
+        </p:nvSpPr>
+        <p:spPr>
+          <a:xfrm>
+            <a:off x="969275" y="0"/>
+            <a:ext cx="1673100" cy="650700"/>
+          </a:xfrm>
+          <a:prstGeom prst="rect">
+            <a:avLst/>
+          </a:prstGeom>
+          <a:noFill/>
+          <a:ln>
+            <a:noFill/>
+          </a:ln>
+        </p:spPr>
+        <p:txBody>
+          <a:bodyPr spcFirstLastPara="1" wrap="square" lIns="167625" tIns="167625" rIns="167625" bIns="167625" anchor="t" anchorCtr="0">
+            <a:noAutofit/>
+          </a:bodyPr>
+          <a:lstStyle/>
+          <a:p>
+            <a:pPr marL="0" lvl="0" indent="0" algn="l" rtl="0">
+              <a:lnSpc>
+                <a:spcPct val="100000"/>
+              </a:lnSpc>
+              <a:spcBef>
+                <a:spcPts val="0"/>
+              </a:spcBef>
+              <a:spcAft>
+                <a:spcPts val="0"/>
+              </a:spcAft>
+              <a:buSzPts val="1800"/>
+              <a:buNone/>
+            </a:pPr>
+            <a:r>
+              <a:rPr lang="en-US"/>
+              <a:t>Slide </a:t>
+            </a:r>
+            <a:fld id="{00000000-1234-1234-1234-123412341234}" type="slidenum">
+              <a:rPr lang="en-US"/>
+              <a:t>78</a:t>
+            </a:fld>
+            <a:endParaRPr/>
+          </a:p>
+        </p:txBody>
+      </p:sp>
+      <p:sp>
+        <p:nvSpPr>
+          <p:cNvPr id="648" name="Google Shape;648;p85"/>
+          <p:cNvSpPr txBox="1"/>
+          <p:nvPr/>
+        </p:nvSpPr>
+        <p:spPr>
+          <a:xfrm>
+            <a:off x="7339913" y="6759655"/>
+            <a:ext cx="3608100" cy="1015800"/>
+          </a:xfrm>
+          <a:prstGeom prst="rect">
+            <a:avLst/>
+          </a:prstGeom>
+          <a:noFill/>
+          <a:ln>
+            <a:noFill/>
+          </a:ln>
+        </p:spPr>
+        <p:txBody>
+          <a:bodyPr spcFirstLastPara="1" wrap="square" lIns="91425" tIns="45700" rIns="91425" bIns="45700" anchor="t" anchorCtr="0">
+            <a:spAutoFit/>
+          </a:bodyPr>
+          <a:lstStyle/>
+          <a:p>
+            <a:pPr marL="0" marR="0" lvl="0" indent="0" algn="l" rtl="0">
+              <a:lnSpc>
+                <a:spcPct val="100000"/>
+              </a:lnSpc>
+              <a:spcBef>
+                <a:spcPts val="0"/>
+              </a:spcBef>
+              <a:spcAft>
+                <a:spcPts val="0"/>
+              </a:spcAft>
+              <a:buNone/>
+            </a:pPr>
+            <a:r>
+              <a:rPr lang="en-US" sz="6000" b="0" i="0" u="none" strike="noStrike" cap="none">
+                <a:solidFill>
+                  <a:srgbClr val="4A0D50"/>
+                </a:solidFill>
+                <a:latin typeface="Fredoka"/>
+                <a:ea typeface="Fredoka"/>
+                <a:cs typeface="Fredoka"/>
+                <a:sym typeface="Fredoka"/>
+              </a:rPr>
+              <a:t>Lesson </a:t>
+            </a:r>
+            <a:r>
+              <a:rPr lang="en-US" sz="6000">
+                <a:solidFill>
+                  <a:srgbClr val="4A0D50"/>
+                </a:solidFill>
+                <a:latin typeface="Fredoka"/>
+                <a:ea typeface="Fredoka"/>
+                <a:cs typeface="Fredoka"/>
+                <a:sym typeface="Fredoka"/>
+              </a:rPr>
+              <a:t>8</a:t>
+            </a:r>
+            <a:endParaRPr sz="1400" b="0" i="0" u="none" strike="noStrike" cap="none">
+              <a:solidFill>
+                <a:srgbClr val="000000"/>
+              </a:solidFill>
+              <a:latin typeface="Arial"/>
+              <a:ea typeface="Arial"/>
+              <a:cs typeface="Arial"/>
+              <a:sym typeface="Arial"/>
+            </a:endParaRPr>
+          </a:p>
+        </p:txBody>
+      </p:sp>
+    </p:spTree>
+  </p:cSld>
+  <p:clrMapOvr>
+    <a:masterClrMapping/>
+  </p:clrMapOvr>
+</p:sld>
+</file>
+
+<file path=ppt/slides/slide79.xml><?xml version="1.0" encoding="utf-8"?>
+<p:sld xmlns:a="http://schemas.openxmlformats.org/drawingml/2006/main" xmlns:r="http://schemas.openxmlformats.org/officeDocument/2006/relationships" xmlns:p="http://schemas.openxmlformats.org/presentationml/2006/main">
+  <p:cSld>
+    <p:spTree>
+      <p:nvGrpSpPr>
+        <p:cNvPr id="1" name="Shape 652"/>
+        <p:cNvGrpSpPr/>
+        <p:nvPr/>
+      </p:nvGrpSpPr>
+      <p:grpSpPr>
+        <a:xfrm>
+          <a:off x="0" y="0"/>
+          <a:ext cx="0" cy="0"/>
+          <a:chOff x="0" y="0"/>
+          <a:chExt cx="0" cy="0"/>
+        </a:xfrm>
+      </p:grpSpPr>
+      <p:sp>
+        <p:nvSpPr>
+          <p:cNvPr id="653" name="Google Shape;653;p86"/>
+          <p:cNvSpPr txBox="1">
+            <a:spLocks noGrp="1"/>
+          </p:cNvSpPr>
+          <p:nvPr>
+            <p:ph type="body" idx="1"/>
+          </p:nvPr>
+        </p:nvSpPr>
+        <p:spPr>
+          <a:xfrm>
+            <a:off x="3228200" y="4448425"/>
+            <a:ext cx="12156000" cy="4726500"/>
+          </a:xfrm>
+          <a:prstGeom prst="rect">
+            <a:avLst/>
+          </a:prstGeom>
+          <a:noFill/>
+          <a:ln>
+            <a:noFill/>
+          </a:ln>
+        </p:spPr>
+        <p:txBody>
+          <a:bodyPr spcFirstLastPara="1" wrap="square" lIns="91425" tIns="91425" rIns="91425" bIns="91425" anchor="t" anchorCtr="0">
+            <a:noAutofit/>
+          </a:bodyPr>
+          <a:lstStyle/>
+          <a:p>
+            <a:pPr marL="457200" lvl="0" indent="-419100" algn="l" rtl="0">
+              <a:spcBef>
+                <a:spcPts val="600"/>
+              </a:spcBef>
+              <a:spcAft>
+                <a:spcPts val="0"/>
+              </a:spcAft>
+              <a:buSzPts val="3000"/>
+              <a:buChar char="●"/>
+            </a:pPr>
+            <a:r>
+              <a:rPr lang="en-US"/>
+              <a:t>Recap on the game concepts covered in Lesson 7</a:t>
+            </a:r>
+            <a:endParaRPr/>
+          </a:p>
+          <a:p>
+            <a:pPr marL="457200" lvl="0" indent="-419100" algn="l" rtl="0">
+              <a:spcBef>
+                <a:spcPts val="0"/>
+              </a:spcBef>
+              <a:spcAft>
+                <a:spcPts val="0"/>
+              </a:spcAft>
+              <a:buSzPts val="3000"/>
+              <a:buChar char="●"/>
+            </a:pPr>
+            <a:r>
+              <a:rPr lang="en-US"/>
+              <a:t>Customise these to your own ideas</a:t>
+            </a:r>
+            <a:endParaRPr/>
+          </a:p>
+          <a:p>
+            <a:pPr marL="457200" lvl="0" indent="-419100" algn="l" rtl="0">
+              <a:spcBef>
+                <a:spcPts val="0"/>
+              </a:spcBef>
+              <a:spcAft>
+                <a:spcPts val="0"/>
+              </a:spcAft>
+              <a:buSzPts val="3000"/>
+              <a:buChar char="●"/>
+            </a:pPr>
+            <a:r>
+              <a:rPr lang="en-US"/>
+              <a:t>Look at some more advanced ideas like: cameras and scrolling screens and tile maps</a:t>
+            </a:r>
+            <a:endParaRPr/>
+          </a:p>
+          <a:p>
+            <a:pPr marL="0" lvl="0" indent="0" algn="l" rtl="0">
+              <a:spcBef>
+                <a:spcPts val="600"/>
+              </a:spcBef>
+              <a:spcAft>
+                <a:spcPts val="0"/>
+              </a:spcAft>
+              <a:buNone/>
+            </a:pPr>
+            <a:endParaRPr/>
+          </a:p>
+        </p:txBody>
+      </p:sp>
+      <p:sp>
+        <p:nvSpPr>
+          <p:cNvPr id="654" name="Google Shape;654;p86"/>
+          <p:cNvSpPr txBox="1">
+            <a:spLocks noGrp="1"/>
+          </p:cNvSpPr>
+          <p:nvPr>
+            <p:ph type="sldNum" idx="12"/>
+          </p:nvPr>
+        </p:nvSpPr>
+        <p:spPr>
+          <a:xfrm>
+            <a:off x="15965075" y="9636275"/>
+            <a:ext cx="1673100" cy="650700"/>
+          </a:xfrm>
+          <a:prstGeom prst="rect">
+            <a:avLst/>
+          </a:prstGeom>
+          <a:noFill/>
+          <a:ln>
+            <a:noFill/>
+          </a:ln>
+        </p:spPr>
+        <p:txBody>
+          <a:bodyPr spcFirstLastPara="1" wrap="square" lIns="91425" tIns="91425" rIns="91425" bIns="91425" anchor="t" anchorCtr="0">
+            <a:noAutofit/>
+          </a:bodyPr>
+          <a:lstStyle/>
+          <a:p>
+            <a:pPr marL="0" lvl="0" indent="0" algn="l" rtl="0">
+              <a:lnSpc>
+                <a:spcPct val="100000"/>
+              </a:lnSpc>
+              <a:spcBef>
+                <a:spcPts val="0"/>
+              </a:spcBef>
+              <a:spcAft>
+                <a:spcPts val="0"/>
+              </a:spcAft>
+              <a:buSzPts val="1400"/>
+              <a:buNone/>
+            </a:pPr>
+            <a:fld id="{00000000-1234-1234-1234-123412341234}" type="slidenum">
+              <a:rPr lang="en-US"/>
+              <a:t>79</a:t>
+            </a:fld>
+            <a:endParaRPr/>
+          </a:p>
+        </p:txBody>
+      </p:sp>
+      <p:sp>
+        <p:nvSpPr>
+          <p:cNvPr id="655" name="Google Shape;655;p86"/>
+          <p:cNvSpPr txBox="1">
+            <a:spLocks noGrp="1"/>
+          </p:cNvSpPr>
+          <p:nvPr>
+            <p:ph type="sldNum" idx="2"/>
+          </p:nvPr>
+        </p:nvSpPr>
+        <p:spPr>
+          <a:xfrm>
+            <a:off x="969275" y="0"/>
+            <a:ext cx="1673100" cy="650700"/>
+          </a:xfrm>
+          <a:prstGeom prst="rect">
+            <a:avLst/>
+          </a:prstGeom>
+          <a:noFill/>
+          <a:ln>
+            <a:noFill/>
+          </a:ln>
+        </p:spPr>
+        <p:txBody>
+          <a:bodyPr spcFirstLastPara="1" wrap="square" lIns="167625" tIns="167625" rIns="167625" bIns="167625" anchor="t" anchorCtr="0">
+            <a:noAutofit/>
+          </a:bodyPr>
+          <a:lstStyle/>
+          <a:p>
+            <a:pPr marL="0" lvl="0" indent="0" algn="l" rtl="0">
+              <a:lnSpc>
+                <a:spcPct val="100000"/>
+              </a:lnSpc>
+              <a:spcBef>
+                <a:spcPts val="0"/>
+              </a:spcBef>
+              <a:spcAft>
+                <a:spcPts val="0"/>
+              </a:spcAft>
+              <a:buSzPts val="1800"/>
+              <a:buNone/>
+            </a:pPr>
+            <a:r>
+              <a:rPr lang="en-US"/>
+              <a:t>Slide </a:t>
+            </a:r>
+            <a:fld id="{00000000-1234-1234-1234-123412341234}" type="slidenum">
+              <a:rPr lang="en-US"/>
+              <a:t>79</a:t>
+            </a:fld>
+            <a:endParaRPr/>
+          </a:p>
+        </p:txBody>
+      </p:sp>
+    </p:spTree>
+  </p:cSld>
+  <p:clrMapOvr>
+    <a:masterClrMapping/>
+  </p:clrMapOvr>
+  <p:timing>
+    <p:tnLst>
+      <p:par>
+        <p:cTn id="1" dur="indefinite" restart="never" nodeType="tmRoot">
+          <p:childTnLst>
+            <p:seq concurrent="1" nextAc="seek">
+              <p:cTn id="2" dur="indefinite" nodeType="mainSeq">
+                <p:childTnLst>
+                  <p:par>
+                    <p:cTn id="3" fill="hold">
+                      <p:stCondLst>
+                        <p:cond delay="indefinite"/>
+                      </p:stCondLst>
+                      <p:childTnLst>
+                        <p:par>
+                          <p:cTn id="4" fill="hold">
+                            <p:stCondLst>
+                              <p:cond delay="0"/>
+                            </p:stCondLst>
+                            <p:childTnLst>
+                              <p:par>
+                                <p:cTn id="5" presetID="1" presetClass="entr" presetSubtype="0" fill="hold" nodeType="clickEffect">
+                                  <p:stCondLst>
+                                    <p:cond delay="0"/>
+                                  </p:stCondLst>
+                                  <p:childTnLst>
+                                    <p:set>
+                                      <p:cBhvr>
+                                        <p:cTn id="6" dur="1" fill="hold">
+                                          <p:stCondLst>
+                                            <p:cond delay="0"/>
+                                          </p:stCondLst>
+                                        </p:cTn>
+                                        <p:tgtEl>
+                                          <p:spTgt spid="653">
+                                            <p:txEl>
+                                              <p:pRg st="0" end="0"/>
+                                            </p:txEl>
+                                          </p:spTgt>
+                                        </p:tgtEl>
+                                        <p:attrNameLst>
+                                          <p:attrName>style.visibility</p:attrName>
+                                        </p:attrNameLst>
+                                      </p:cBhvr>
+                                      <p:to>
+                                        <p:strVal val="visible"/>
+                                      </p:to>
+                                    </p:set>
+                                  </p:childTnLst>
+                                </p:cTn>
+                              </p:par>
+                            </p:childTnLst>
+                          </p:cTn>
+                        </p:par>
+                      </p:childTnLst>
+                    </p:cTn>
+                  </p:par>
+                  <p:par>
+                    <p:cTn id="7" fill="hold">
+                      <p:stCondLst>
+                        <p:cond delay="indefinite"/>
+                      </p:stCondLst>
+                      <p:childTnLst>
+                        <p:par>
+                          <p:cTn id="8" fill="hold">
+                            <p:stCondLst>
+                              <p:cond delay="0"/>
+                            </p:stCondLst>
+                            <p:childTnLst>
+                              <p:par>
+                                <p:cTn id="9" presetID="1" presetClass="entr" presetSubtype="0" fill="hold" nodeType="clickEffect">
+                                  <p:stCondLst>
+                                    <p:cond delay="0"/>
+                                  </p:stCondLst>
+                                  <p:childTnLst>
+                                    <p:set>
+                                      <p:cBhvr>
+                                        <p:cTn id="10" dur="1" fill="hold">
+                                          <p:stCondLst>
+                                            <p:cond delay="0"/>
+                                          </p:stCondLst>
+                                        </p:cTn>
+                                        <p:tgtEl>
+                                          <p:spTgt spid="653">
+                                            <p:txEl>
+                                              <p:pRg st="1" end="1"/>
+                                            </p:txEl>
+                                          </p:spTgt>
+                                        </p:tgtEl>
+                                        <p:attrNameLst>
+                                          <p:attrName>style.visibility</p:attrName>
+                                        </p:attrNameLst>
+                                      </p:cBhvr>
+                                      <p:to>
+                                        <p:strVal val="visible"/>
+                                      </p:to>
+                                    </p:set>
+                                  </p:childTnLst>
+                                </p:cTn>
+                              </p:par>
+                            </p:childTnLst>
+                          </p:cTn>
+                        </p:par>
+                      </p:childTnLst>
+                    </p:cTn>
+                  </p:par>
+                  <p:par>
+                    <p:cTn id="11" fill="hold">
+                      <p:stCondLst>
+                        <p:cond delay="indefinite"/>
+                      </p:stCondLst>
+                      <p:childTnLst>
+                        <p:par>
+                          <p:cTn id="12" fill="hold">
+                            <p:stCondLst>
+                              <p:cond delay="0"/>
+                            </p:stCondLst>
+                            <p:childTnLst>
+                              <p:par>
+                                <p:cTn id="13" presetID="1" presetClass="entr" presetSubtype="0" fill="hold" nodeType="clickEffect">
+                                  <p:stCondLst>
+                                    <p:cond delay="0"/>
+                                  </p:stCondLst>
+                                  <p:childTnLst>
+                                    <p:set>
+                                      <p:cBhvr>
+                                        <p:cTn id="14" dur="1" fill="hold">
+                                          <p:stCondLst>
+                                            <p:cond delay="0"/>
+                                          </p:stCondLst>
+                                        </p:cTn>
+                                        <p:tgtEl>
+                                          <p:spTgt spid="653">
+                                            <p:txEl>
+                                              <p:pRg st="2" end="2"/>
+                                            </p:txEl>
+                                          </p:spTgt>
+                                        </p:tgtEl>
+                                        <p:attrNameLst>
+                                          <p:attrName>style.visibility</p:attrName>
+                                        </p:attrNameLst>
+                                      </p:cBhvr>
+                                      <p:to>
+                                        <p:strVal val="visible"/>
+                                      </p:to>
+                                    </p:set>
+                                  </p:childTnLst>
+                                </p:cTn>
+                              </p:par>
+                            </p:childTnLst>
+                          </p:cTn>
+                        </p:par>
+                      </p:childTnLst>
+                    </p:cTn>
+                  </p:par>
+                  <p:par>
+                    <p:cTn id="15" fill="hold">
+                      <p:stCondLst>
+                        <p:cond delay="indefinite"/>
+                      </p:stCondLst>
+                      <p:childTnLst>
+                        <p:par>
+                          <p:cTn id="16" fill="hold">
+                            <p:stCondLst>
+                              <p:cond delay="0"/>
+                            </p:stCondLst>
+                            <p:childTnLst>
+                              <p:par>
+                                <p:cTn id="17" presetID="1" presetClass="entr" presetSubtype="0" fill="hold" nodeType="clickEffect">
+                                  <p:stCondLst>
+                                    <p:cond delay="0"/>
+                                  </p:stCondLst>
+                                  <p:childTnLst>
+                                    <p:set>
+                                      <p:cBhvr>
+                                        <p:cTn id="18" dur="1" fill="hold">
+                                          <p:stCondLst>
+                                            <p:cond delay="0"/>
+                                          </p:stCondLst>
+                                        </p:cTn>
+                                        <p:tgtEl>
+                                          <p:spTgt spid="653">
+                                            <p:txEl>
+                                              <p:pRg st="3" end="3"/>
+                                            </p:txEl>
+                                          </p:spTgt>
+                                        </p:tgtEl>
+                                        <p:attrNameLst>
+                                          <p:attrName>style.visibility</p:attrName>
+                                        </p:attrNameLst>
+                                      </p:cBhvr>
+                                      <p:to>
+                                        <p:strVal val="visible"/>
+                                      </p:to>
+                                    </p:set>
+                                  </p:childTnLst>
+                                </p:cTn>
+                              </p:par>
+                            </p:childTnLst>
+                          </p:cTn>
+                        </p:par>
+                      </p:childTnLst>
+                    </p:cTn>
+                  </p:par>
+                </p:childTnLst>
+              </p:cTn>
+              <p:prevCondLst>
+                <p:cond evt="onPrev" delay="0">
+                  <p:tgtEl>
+                    <p:sldTgt/>
+                  </p:tgtEl>
+                </p:cond>
+              </p:prevCondLst>
+              <p:nextCondLst>
+                <p:cond evt="onNext" delay="0">
+                  <p:tgtEl>
+                    <p:sldTgt/>
+                  </p:tgtEl>
+                </p:cond>
+              </p:nextCondLst>
+            </p:seq>
+          </p:childTnLst>
+        </p:cTn>
+      </p:par>
+    </p:tnLst>
+  </p:timing>
 </p:sld>
 </file>
 

</xml_diff>